<commit_message>
finish the stage 1 documents
</commit_message>
<xml_diff>
--- a/doc/Courschematser.pptx
+++ b/doc/Courschematser.pptx
@@ -1,26 +1,33 @@
 
 <file path=ppt/presentation.xml><?xml version="1.0" encoding="utf-8"?>
-<p:presentation xmlns:a="http://schemas.openxmlformats.org/drawingml/2006/main" xmlns:r="http://schemas.openxmlformats.org/officeDocument/2006/relationships" xmlns:p="http://schemas.openxmlformats.org/presentationml/2006/main" saveSubsetFonts="1">
+<p:presentation xmlns:a="http://schemas.openxmlformats.org/drawingml/2006/main" xmlns:r="http://schemas.openxmlformats.org/officeDocument/2006/relationships" xmlns:p="http://schemas.openxmlformats.org/presentationml/2006/main">
   <p:sldMasterIdLst>
-    <p:sldMasterId id="2147483934" r:id="rId1"/>
+    <p:sldMasterId id="2147483648" r:id="rId1"/>
   </p:sldMasterIdLst>
+  <p:notesMasterIdLst>
+    <p:notesMasterId r:id="rId22"/>
+  </p:notesMasterIdLst>
   <p:sldIdLst>
     <p:sldId id="256" r:id="rId2"/>
     <p:sldId id="257" r:id="rId3"/>
     <p:sldId id="275" r:id="rId4"/>
-    <p:sldId id="276" r:id="rId5"/>
-    <p:sldId id="260" r:id="rId6"/>
-    <p:sldId id="272" r:id="rId7"/>
-    <p:sldId id="273" r:id="rId8"/>
-    <p:sldId id="274" r:id="rId9"/>
-    <p:sldId id="270" r:id="rId10"/>
-    <p:sldId id="263" r:id="rId11"/>
-    <p:sldId id="265" r:id="rId12"/>
-    <p:sldId id="266" r:id="rId13"/>
-    <p:sldId id="269" r:id="rId14"/>
-    <p:sldId id="271" r:id="rId15"/>
-    <p:sldId id="277" r:id="rId16"/>
-    <p:sldId id="264" r:id="rId17"/>
+    <p:sldId id="291" r:id="rId5"/>
+    <p:sldId id="292" r:id="rId6"/>
+    <p:sldId id="293" r:id="rId7"/>
+    <p:sldId id="294" r:id="rId8"/>
+    <p:sldId id="295" r:id="rId9"/>
+    <p:sldId id="260" r:id="rId10"/>
+    <p:sldId id="272" r:id="rId11"/>
+    <p:sldId id="273" r:id="rId12"/>
+    <p:sldId id="274" r:id="rId13"/>
+    <p:sldId id="270" r:id="rId14"/>
+    <p:sldId id="263" r:id="rId15"/>
+    <p:sldId id="265" r:id="rId16"/>
+    <p:sldId id="266" r:id="rId17"/>
+    <p:sldId id="269" r:id="rId18"/>
+    <p:sldId id="271" r:id="rId19"/>
+    <p:sldId id="277" r:id="rId20"/>
+    <p:sldId id="264" r:id="rId21"/>
   </p:sldIdLst>
   <p:sldSz cx="12192000" cy="6858000"/>
   <p:notesSz cx="6858000" cy="9144000"/>
@@ -125,6 +132,574 @@
     </p:ext>
   </p:extLst>
 </p:presentation>
+</file>
+
+<file path=ppt/notesMasters/notesMaster1.xml><?xml version="1.0" encoding="utf-8"?>
+<p:notesMaster xmlns:a="http://schemas.openxmlformats.org/drawingml/2006/main" xmlns:r="http://schemas.openxmlformats.org/officeDocument/2006/relationships" xmlns:p="http://schemas.openxmlformats.org/presentationml/2006/main">
+  <p:cSld>
+    <p:bg>
+      <p:bgRef idx="1001">
+        <a:schemeClr val="bg1"/>
+      </p:bgRef>
+    </p:bg>
+    <p:spTree>
+      <p:nvGrpSpPr>
+        <p:cNvPr id="1" name=""/>
+        <p:cNvGrpSpPr/>
+        <p:nvPr/>
+      </p:nvGrpSpPr>
+      <p:grpSpPr>
+        <a:xfrm>
+          <a:off x="0" y="0"/>
+          <a:ext cx="0" cy="0"/>
+          <a:chOff x="0" y="0"/>
+          <a:chExt cx="0" cy="0"/>
+        </a:xfrm>
+      </p:grpSpPr>
+      <p:sp>
+        <p:nvSpPr>
+          <p:cNvPr id="2" name="页眉占位符 1"/>
+          <p:cNvSpPr>
+            <a:spLocks noGrp="1"/>
+          </p:cNvSpPr>
+          <p:nvPr>
+            <p:ph type="hdr" sz="quarter"/>
+          </p:nvPr>
+        </p:nvSpPr>
+        <p:spPr>
+          <a:xfrm>
+            <a:off x="0" y="0"/>
+            <a:ext cx="2971800" cy="458788"/>
+          </a:xfrm>
+          <a:prstGeom prst="rect">
+            <a:avLst/>
+          </a:prstGeom>
+        </p:spPr>
+        <p:txBody>
+          <a:bodyPr vert="horz" lIns="91440" tIns="45720" rIns="91440" bIns="45720" rtlCol="0"/>
+          <a:lstStyle>
+            <a:lvl1pPr algn="l">
+              <a:defRPr sz="1200"/>
+            </a:lvl1pPr>
+          </a:lstStyle>
+          <a:p>
+            <a:endParaRPr lang="zh-CN" altLang="en-US"/>
+          </a:p>
+        </p:txBody>
+      </p:sp>
+      <p:sp>
+        <p:nvSpPr>
+          <p:cNvPr id="3" name="日期占位符 2"/>
+          <p:cNvSpPr>
+            <a:spLocks noGrp="1"/>
+          </p:cNvSpPr>
+          <p:nvPr>
+            <p:ph type="dt" idx="1"/>
+          </p:nvPr>
+        </p:nvSpPr>
+        <p:spPr>
+          <a:xfrm>
+            <a:off x="3884613" y="0"/>
+            <a:ext cx="2971800" cy="458788"/>
+          </a:xfrm>
+          <a:prstGeom prst="rect">
+            <a:avLst/>
+          </a:prstGeom>
+        </p:spPr>
+        <p:txBody>
+          <a:bodyPr vert="horz" lIns="91440" tIns="45720" rIns="91440" bIns="45720" rtlCol="0"/>
+          <a:lstStyle>
+            <a:lvl1pPr algn="r">
+              <a:defRPr sz="1200"/>
+            </a:lvl1pPr>
+          </a:lstStyle>
+          <a:p>
+            <a:fld id="{D2A48B96-639E-45A3-A0BA-2464DFDB1FAA}" type="datetimeFigureOut">
+              <a:rPr lang="zh-CN" altLang="en-US" smtClean="0"/>
+              <a:t>2019/10/9</a:t>
+            </a:fld>
+            <a:endParaRPr lang="zh-CN" altLang="en-US"/>
+          </a:p>
+        </p:txBody>
+      </p:sp>
+      <p:sp>
+        <p:nvSpPr>
+          <p:cNvPr id="4" name="幻灯片图像占位符 3"/>
+          <p:cNvSpPr>
+            <a:spLocks noGrp="1" noRot="1" noChangeAspect="1"/>
+          </p:cNvSpPr>
+          <p:nvPr>
+            <p:ph type="sldImg" idx="2"/>
+          </p:nvPr>
+        </p:nvSpPr>
+        <p:spPr>
+          <a:xfrm>
+            <a:off x="685800" y="1143000"/>
+            <a:ext cx="5486400" cy="3086100"/>
+          </a:xfrm>
+          <a:prstGeom prst="rect">
+            <a:avLst/>
+          </a:prstGeom>
+          <a:noFill/>
+          <a:ln w="12700">
+            <a:solidFill>
+              <a:prstClr val="black"/>
+            </a:solidFill>
+          </a:ln>
+        </p:spPr>
+        <p:txBody>
+          <a:bodyPr vert="horz" lIns="91440" tIns="45720" rIns="91440" bIns="45720" rtlCol="0" anchor="ctr"/>
+          <a:lstStyle/>
+          <a:p>
+            <a:endParaRPr lang="zh-CN" altLang="en-US"/>
+          </a:p>
+        </p:txBody>
+      </p:sp>
+      <p:sp>
+        <p:nvSpPr>
+          <p:cNvPr id="5" name="备注占位符 4"/>
+          <p:cNvSpPr>
+            <a:spLocks noGrp="1"/>
+          </p:cNvSpPr>
+          <p:nvPr>
+            <p:ph type="body" sz="quarter" idx="3"/>
+          </p:nvPr>
+        </p:nvSpPr>
+        <p:spPr>
+          <a:xfrm>
+            <a:off x="685800" y="4400550"/>
+            <a:ext cx="5486400" cy="3600450"/>
+          </a:xfrm>
+          <a:prstGeom prst="rect">
+            <a:avLst/>
+          </a:prstGeom>
+        </p:spPr>
+        <p:txBody>
+          <a:bodyPr vert="horz" lIns="91440" tIns="45720" rIns="91440" bIns="45720" rtlCol="0"/>
+          <a:lstStyle/>
+          <a:p>
+            <a:pPr lvl="0"/>
+            <a:r>
+              <a:rPr lang="zh-CN" altLang="en-US"/>
+              <a:t>单击此处编辑母版文本样式</a:t>
+            </a:r>
+          </a:p>
+          <a:p>
+            <a:pPr lvl="1"/>
+            <a:r>
+              <a:rPr lang="zh-CN" altLang="en-US"/>
+              <a:t>第二级</a:t>
+            </a:r>
+          </a:p>
+          <a:p>
+            <a:pPr lvl="2"/>
+            <a:r>
+              <a:rPr lang="zh-CN" altLang="en-US"/>
+              <a:t>第三级</a:t>
+            </a:r>
+          </a:p>
+          <a:p>
+            <a:pPr lvl="3"/>
+            <a:r>
+              <a:rPr lang="zh-CN" altLang="en-US"/>
+              <a:t>第四级</a:t>
+            </a:r>
+          </a:p>
+          <a:p>
+            <a:pPr lvl="4"/>
+            <a:r>
+              <a:rPr lang="zh-CN" altLang="en-US"/>
+              <a:t>第五级</a:t>
+            </a:r>
+          </a:p>
+        </p:txBody>
+      </p:sp>
+      <p:sp>
+        <p:nvSpPr>
+          <p:cNvPr id="6" name="页脚占位符 5"/>
+          <p:cNvSpPr>
+            <a:spLocks noGrp="1"/>
+          </p:cNvSpPr>
+          <p:nvPr>
+            <p:ph type="ftr" sz="quarter" idx="4"/>
+          </p:nvPr>
+        </p:nvSpPr>
+        <p:spPr>
+          <a:xfrm>
+            <a:off x="0" y="8685213"/>
+            <a:ext cx="2971800" cy="458787"/>
+          </a:xfrm>
+          <a:prstGeom prst="rect">
+            <a:avLst/>
+          </a:prstGeom>
+        </p:spPr>
+        <p:txBody>
+          <a:bodyPr vert="horz" lIns="91440" tIns="45720" rIns="91440" bIns="45720" rtlCol="0" anchor="b"/>
+          <a:lstStyle>
+            <a:lvl1pPr algn="l">
+              <a:defRPr sz="1200"/>
+            </a:lvl1pPr>
+          </a:lstStyle>
+          <a:p>
+            <a:endParaRPr lang="zh-CN" altLang="en-US"/>
+          </a:p>
+        </p:txBody>
+      </p:sp>
+      <p:sp>
+        <p:nvSpPr>
+          <p:cNvPr id="7" name="灯片编号占位符 6"/>
+          <p:cNvSpPr>
+            <a:spLocks noGrp="1"/>
+          </p:cNvSpPr>
+          <p:nvPr>
+            <p:ph type="sldNum" sz="quarter" idx="5"/>
+          </p:nvPr>
+        </p:nvSpPr>
+        <p:spPr>
+          <a:xfrm>
+            <a:off x="3884613" y="8685213"/>
+            <a:ext cx="2971800" cy="458787"/>
+          </a:xfrm>
+          <a:prstGeom prst="rect">
+            <a:avLst/>
+          </a:prstGeom>
+        </p:spPr>
+        <p:txBody>
+          <a:bodyPr vert="horz" lIns="91440" tIns="45720" rIns="91440" bIns="45720" rtlCol="0" anchor="b"/>
+          <a:lstStyle>
+            <a:lvl1pPr algn="r">
+              <a:defRPr sz="1200"/>
+            </a:lvl1pPr>
+          </a:lstStyle>
+          <a:p>
+            <a:fld id="{A6837353-30EB-4A48-80EB-173D804AEFBD}" type="slidenum">
+              <a:rPr lang="zh-CN" altLang="en-US" smtClean="0"/>
+              <a:t>‹#›</a:t>
+            </a:fld>
+            <a:endParaRPr lang="zh-CN" altLang="en-US"/>
+          </a:p>
+        </p:txBody>
+      </p:sp>
+    </p:spTree>
+  </p:cSld>
+  <p:clrMap bg1="lt1" tx1="dk1" bg2="lt2" tx2="dk2" accent1="accent1" accent2="accent2" accent3="accent3" accent4="accent4" accent5="accent5" accent6="accent6" hlink="hlink" folHlink="folHlink"/>
+  <p:notesStyle>
+    <a:lvl1pPr marL="0" algn="l" defTabSz="914400" rtl="0" eaLnBrk="1" latinLnBrk="0" hangingPunct="1">
+      <a:defRPr sz="1200" kern="1200">
+        <a:solidFill>
+          <a:schemeClr val="tx1"/>
+        </a:solidFill>
+        <a:latin typeface="+mn-lt"/>
+        <a:ea typeface="+mn-ea"/>
+        <a:cs typeface="+mn-cs"/>
+      </a:defRPr>
+    </a:lvl1pPr>
+    <a:lvl2pPr marL="457200" algn="l" defTabSz="914400" rtl="0" eaLnBrk="1" latinLnBrk="0" hangingPunct="1">
+      <a:defRPr sz="1200" kern="1200">
+        <a:solidFill>
+          <a:schemeClr val="tx1"/>
+        </a:solidFill>
+        <a:latin typeface="+mn-lt"/>
+        <a:ea typeface="+mn-ea"/>
+        <a:cs typeface="+mn-cs"/>
+      </a:defRPr>
+    </a:lvl2pPr>
+    <a:lvl3pPr marL="914400" algn="l" defTabSz="914400" rtl="0" eaLnBrk="1" latinLnBrk="0" hangingPunct="1">
+      <a:defRPr sz="1200" kern="1200">
+        <a:solidFill>
+          <a:schemeClr val="tx1"/>
+        </a:solidFill>
+        <a:latin typeface="+mn-lt"/>
+        <a:ea typeface="+mn-ea"/>
+        <a:cs typeface="+mn-cs"/>
+      </a:defRPr>
+    </a:lvl3pPr>
+    <a:lvl4pPr marL="1371600" algn="l" defTabSz="914400" rtl="0" eaLnBrk="1" latinLnBrk="0" hangingPunct="1">
+      <a:defRPr sz="1200" kern="1200">
+        <a:solidFill>
+          <a:schemeClr val="tx1"/>
+        </a:solidFill>
+        <a:latin typeface="+mn-lt"/>
+        <a:ea typeface="+mn-ea"/>
+        <a:cs typeface="+mn-cs"/>
+      </a:defRPr>
+    </a:lvl4pPr>
+    <a:lvl5pPr marL="1828800" algn="l" defTabSz="914400" rtl="0" eaLnBrk="1" latinLnBrk="0" hangingPunct="1">
+      <a:defRPr sz="1200" kern="1200">
+        <a:solidFill>
+          <a:schemeClr val="tx1"/>
+        </a:solidFill>
+        <a:latin typeface="+mn-lt"/>
+        <a:ea typeface="+mn-ea"/>
+        <a:cs typeface="+mn-cs"/>
+      </a:defRPr>
+    </a:lvl5pPr>
+    <a:lvl6pPr marL="2286000" algn="l" defTabSz="914400" rtl="0" eaLnBrk="1" latinLnBrk="0" hangingPunct="1">
+      <a:defRPr sz="1200" kern="1200">
+        <a:solidFill>
+          <a:schemeClr val="tx1"/>
+        </a:solidFill>
+        <a:latin typeface="+mn-lt"/>
+        <a:ea typeface="+mn-ea"/>
+        <a:cs typeface="+mn-cs"/>
+      </a:defRPr>
+    </a:lvl6pPr>
+    <a:lvl7pPr marL="2743200" algn="l" defTabSz="914400" rtl="0" eaLnBrk="1" latinLnBrk="0" hangingPunct="1">
+      <a:defRPr sz="1200" kern="1200">
+        <a:solidFill>
+          <a:schemeClr val="tx1"/>
+        </a:solidFill>
+        <a:latin typeface="+mn-lt"/>
+        <a:ea typeface="+mn-ea"/>
+        <a:cs typeface="+mn-cs"/>
+      </a:defRPr>
+    </a:lvl7pPr>
+    <a:lvl8pPr marL="3200400" algn="l" defTabSz="914400" rtl="0" eaLnBrk="1" latinLnBrk="0" hangingPunct="1">
+      <a:defRPr sz="1200" kern="1200">
+        <a:solidFill>
+          <a:schemeClr val="tx1"/>
+        </a:solidFill>
+        <a:latin typeface="+mn-lt"/>
+        <a:ea typeface="+mn-ea"/>
+        <a:cs typeface="+mn-cs"/>
+      </a:defRPr>
+    </a:lvl8pPr>
+    <a:lvl9pPr marL="3657600" algn="l" defTabSz="914400" rtl="0" eaLnBrk="1" latinLnBrk="0" hangingPunct="1">
+      <a:defRPr sz="1200" kern="1200">
+        <a:solidFill>
+          <a:schemeClr val="tx1"/>
+        </a:solidFill>
+        <a:latin typeface="+mn-lt"/>
+        <a:ea typeface="+mn-ea"/>
+        <a:cs typeface="+mn-cs"/>
+      </a:defRPr>
+    </a:lvl9pPr>
+  </p:notesStyle>
+</p:notesMaster>
+</file>
+
+<file path=ppt/notesSlides/notesSlide1.xml><?xml version="1.0" encoding="utf-8"?>
+<p:notes xmlns:a="http://schemas.openxmlformats.org/drawingml/2006/main" xmlns:r="http://schemas.openxmlformats.org/officeDocument/2006/relationships" xmlns:p="http://schemas.openxmlformats.org/presentationml/2006/main">
+  <p:cSld>
+    <p:spTree>
+      <p:nvGrpSpPr>
+        <p:cNvPr id="1" name=""/>
+        <p:cNvGrpSpPr/>
+        <p:nvPr/>
+      </p:nvGrpSpPr>
+      <p:grpSpPr>
+        <a:xfrm>
+          <a:off x="0" y="0"/>
+          <a:ext cx="0" cy="0"/>
+          <a:chOff x="0" y="0"/>
+          <a:chExt cx="0" cy="0"/>
+        </a:xfrm>
+      </p:grpSpPr>
+      <p:sp>
+        <p:nvSpPr>
+          <p:cNvPr id="2" name="幻灯片图像占位符 1"/>
+          <p:cNvSpPr>
+            <a:spLocks noGrp="1" noRot="1" noChangeAspect="1"/>
+          </p:cNvSpPr>
+          <p:nvPr>
+            <p:ph type="sldImg" idx="2"/>
+          </p:nvPr>
+        </p:nvSpPr>
+        <p:spPr/>
+      </p:sp>
+      <p:sp>
+        <p:nvSpPr>
+          <p:cNvPr id="3" name="文本占位符 2"/>
+          <p:cNvSpPr>
+            <a:spLocks noGrp="1"/>
+          </p:cNvSpPr>
+          <p:nvPr>
+            <p:ph type="body" idx="3"/>
+          </p:nvPr>
+        </p:nvSpPr>
+        <p:spPr/>
+        <p:txBody>
+          <a:bodyPr/>
+          <a:lstStyle/>
+          <a:p>
+            <a:endParaRPr lang="zh-CN" altLang="en-US"/>
+          </a:p>
+        </p:txBody>
+      </p:sp>
+    </p:spTree>
+  </p:cSld>
+  <p:clrMapOvr>
+    <a:masterClrMapping/>
+  </p:clrMapOvr>
+</p:notes>
+</file>
+
+<file path=ppt/notesSlides/notesSlide2.xml><?xml version="1.0" encoding="utf-8"?>
+<p:notes xmlns:a="http://schemas.openxmlformats.org/drawingml/2006/main" xmlns:r="http://schemas.openxmlformats.org/officeDocument/2006/relationships" xmlns:p="http://schemas.openxmlformats.org/presentationml/2006/main">
+  <p:cSld>
+    <p:spTree>
+      <p:nvGrpSpPr>
+        <p:cNvPr id="1" name=""/>
+        <p:cNvGrpSpPr/>
+        <p:nvPr/>
+      </p:nvGrpSpPr>
+      <p:grpSpPr>
+        <a:xfrm>
+          <a:off x="0" y="0"/>
+          <a:ext cx="0" cy="0"/>
+          <a:chOff x="0" y="0"/>
+          <a:chExt cx="0" cy="0"/>
+        </a:xfrm>
+      </p:grpSpPr>
+      <p:sp>
+        <p:nvSpPr>
+          <p:cNvPr id="2" name="幻灯片图像占位符 1"/>
+          <p:cNvSpPr>
+            <a:spLocks noGrp="1" noRot="1" noChangeAspect="1"/>
+          </p:cNvSpPr>
+          <p:nvPr>
+            <p:ph type="sldImg" idx="2"/>
+          </p:nvPr>
+        </p:nvSpPr>
+        <p:spPr/>
+      </p:sp>
+      <p:sp>
+        <p:nvSpPr>
+          <p:cNvPr id="3" name="文本占位符 2"/>
+          <p:cNvSpPr>
+            <a:spLocks noGrp="1"/>
+          </p:cNvSpPr>
+          <p:nvPr>
+            <p:ph type="body" idx="3"/>
+          </p:nvPr>
+        </p:nvSpPr>
+        <p:spPr/>
+        <p:txBody>
+          <a:bodyPr/>
+          <a:lstStyle/>
+          <a:p>
+            <a:endParaRPr lang="zh-CN" altLang="en-US"/>
+          </a:p>
+        </p:txBody>
+      </p:sp>
+    </p:spTree>
+  </p:cSld>
+  <p:clrMapOvr>
+    <a:masterClrMapping/>
+  </p:clrMapOvr>
+</p:notes>
+</file>
+
+<file path=ppt/notesSlides/notesSlide3.xml><?xml version="1.0" encoding="utf-8"?>
+<p:notes xmlns:a="http://schemas.openxmlformats.org/drawingml/2006/main" xmlns:r="http://schemas.openxmlformats.org/officeDocument/2006/relationships" xmlns:p="http://schemas.openxmlformats.org/presentationml/2006/main">
+  <p:cSld>
+    <p:spTree>
+      <p:nvGrpSpPr>
+        <p:cNvPr id="1" name=""/>
+        <p:cNvGrpSpPr/>
+        <p:nvPr/>
+      </p:nvGrpSpPr>
+      <p:grpSpPr>
+        <a:xfrm>
+          <a:off x="0" y="0"/>
+          <a:ext cx="0" cy="0"/>
+          <a:chOff x="0" y="0"/>
+          <a:chExt cx="0" cy="0"/>
+        </a:xfrm>
+      </p:grpSpPr>
+      <p:sp>
+        <p:nvSpPr>
+          <p:cNvPr id="2" name="幻灯片图像占位符 1"/>
+          <p:cNvSpPr>
+            <a:spLocks noGrp="1" noRot="1" noChangeAspect="1"/>
+          </p:cNvSpPr>
+          <p:nvPr>
+            <p:ph type="sldImg" idx="2"/>
+          </p:nvPr>
+        </p:nvSpPr>
+        <p:spPr/>
+      </p:sp>
+      <p:sp>
+        <p:nvSpPr>
+          <p:cNvPr id="3" name="文本占位符 2"/>
+          <p:cNvSpPr>
+            <a:spLocks noGrp="1"/>
+          </p:cNvSpPr>
+          <p:nvPr>
+            <p:ph type="body" idx="3"/>
+          </p:nvPr>
+        </p:nvSpPr>
+        <p:spPr/>
+        <p:txBody>
+          <a:bodyPr/>
+          <a:lstStyle/>
+          <a:p>
+            <a:endParaRPr lang="zh-CN" altLang="en-US"/>
+          </a:p>
+        </p:txBody>
+      </p:sp>
+    </p:spTree>
+  </p:cSld>
+  <p:clrMapOvr>
+    <a:masterClrMapping/>
+  </p:clrMapOvr>
+</p:notes>
+</file>
+
+<file path=ppt/notesSlides/notesSlide4.xml><?xml version="1.0" encoding="utf-8"?>
+<p:notes xmlns:a="http://schemas.openxmlformats.org/drawingml/2006/main" xmlns:r="http://schemas.openxmlformats.org/officeDocument/2006/relationships" xmlns:p="http://schemas.openxmlformats.org/presentationml/2006/main">
+  <p:cSld>
+    <p:spTree>
+      <p:nvGrpSpPr>
+        <p:cNvPr id="1" name=""/>
+        <p:cNvGrpSpPr/>
+        <p:nvPr/>
+      </p:nvGrpSpPr>
+      <p:grpSpPr>
+        <a:xfrm>
+          <a:off x="0" y="0"/>
+          <a:ext cx="0" cy="0"/>
+          <a:chOff x="0" y="0"/>
+          <a:chExt cx="0" cy="0"/>
+        </a:xfrm>
+      </p:grpSpPr>
+      <p:sp>
+        <p:nvSpPr>
+          <p:cNvPr id="2" name="幻灯片图像占位符 1"/>
+          <p:cNvSpPr>
+            <a:spLocks noGrp="1" noRot="1" noChangeAspect="1"/>
+          </p:cNvSpPr>
+          <p:nvPr>
+            <p:ph type="sldImg" idx="2"/>
+          </p:nvPr>
+        </p:nvSpPr>
+        <p:spPr/>
+      </p:sp>
+      <p:sp>
+        <p:nvSpPr>
+          <p:cNvPr id="3" name="文本占位符 2"/>
+          <p:cNvSpPr>
+            <a:spLocks noGrp="1"/>
+          </p:cNvSpPr>
+          <p:nvPr>
+            <p:ph type="body" idx="3"/>
+          </p:nvPr>
+        </p:nvSpPr>
+        <p:spPr/>
+        <p:txBody>
+          <a:bodyPr/>
+          <a:lstStyle/>
+          <a:p>
+            <a:endParaRPr lang="zh-CN" altLang="en-US"/>
+          </a:p>
+        </p:txBody>
+      </p:sp>
+    </p:spTree>
+  </p:cSld>
+  <p:clrMapOvr>
+    <a:masterClrMapping/>
+  </p:clrMapOvr>
+</p:notes>
 </file>
 
 <file path=ppt/slideLayouts/slideLayout1.xml><?xml version="1.0" encoding="utf-8"?>
@@ -851,7 +1426,7 @@
           <a:p>
             <a:fld id="{90E67F42-795B-4328-A964-F7071B005671}" type="datetimeFigureOut">
               <a:rPr lang="zh-CN" altLang="en-US" smtClean="0"/>
-              <a:t>2019/10/5</a:t>
+              <a:t>2019/10/9</a:t>
             </a:fld>
             <a:endParaRPr lang="zh-CN" altLang="en-US"/>
           </a:p>
@@ -900,11 +1475,6 @@
         </p:txBody>
       </p:sp>
     </p:spTree>
-    <p:extLst>
-      <p:ext uri="{BB962C8B-B14F-4D97-AF65-F5344CB8AC3E}">
-        <p14:creationId xmlns:p14="http://schemas.microsoft.com/office/powerpoint/2010/main" val="1612180825"/>
-      </p:ext>
-    </p:extLst>
   </p:cSld>
   <p:clrMapOvr>
     <a:masterClrMapping/>
@@ -1102,7 +1672,7 @@
           <a:p>
             <a:fld id="{90E67F42-795B-4328-A964-F7071B005671}" type="datetimeFigureOut">
               <a:rPr lang="zh-CN" altLang="en-US" smtClean="0"/>
-              <a:t>2019/10/5</a:t>
+              <a:t>2019/10/9</a:t>
             </a:fld>
             <a:endParaRPr lang="zh-CN" altLang="en-US"/>
           </a:p>
@@ -1151,11 +1721,6 @@
         </p:txBody>
       </p:sp>
     </p:spTree>
-    <p:extLst>
-      <p:ext uri="{BB962C8B-B14F-4D97-AF65-F5344CB8AC3E}">
-        <p14:creationId xmlns:p14="http://schemas.microsoft.com/office/powerpoint/2010/main" val="1942440430"/>
-      </p:ext>
-    </p:extLst>
   </p:cSld>
   <p:clrMapOvr>
     <a:masterClrMapping/>
@@ -1416,7 +1981,7 @@
           <a:p>
             <a:fld id="{90E67F42-795B-4328-A964-F7071B005671}" type="datetimeFigureOut">
               <a:rPr lang="zh-CN" altLang="en-US" smtClean="0"/>
-              <a:t>2019/10/5</a:t>
+              <a:t>2019/10/9</a:t>
             </a:fld>
             <a:endParaRPr lang="zh-CN" altLang="en-US"/>
           </a:p>
@@ -1495,7 +2060,7 @@
                   <a:schemeClr val="accent1"/>
                 </a:solidFill>
                 <a:effectLst/>
-                <a:latin typeface="Arial"/>
+                <a:latin typeface="Arial" panose="020B0604020202020204"/>
               </a:rPr>
               <a:t>“</a:t>
             </a:r>
@@ -1533,7 +2098,7 @@
                   <a:schemeClr val="accent1"/>
                 </a:solidFill>
                 <a:effectLst/>
-                <a:latin typeface="Arial"/>
+                <a:latin typeface="Arial" panose="020B0604020202020204"/>
               </a:rPr>
               <a:t>”</a:t>
             </a:r>
@@ -1541,11 +2106,6 @@
         </p:txBody>
       </p:sp>
     </p:spTree>
-    <p:extLst>
-      <p:ext uri="{BB962C8B-B14F-4D97-AF65-F5344CB8AC3E}">
-        <p14:creationId xmlns:p14="http://schemas.microsoft.com/office/powerpoint/2010/main" val="3375030429"/>
-      </p:ext>
-    </p:extLst>
   </p:cSld>
   <p:clrMapOvr>
     <a:masterClrMapping/>
@@ -1743,7 +2303,7 @@
           <a:p>
             <a:fld id="{90E67F42-795B-4328-A964-F7071B005671}" type="datetimeFigureOut">
               <a:rPr lang="zh-CN" altLang="en-US" smtClean="0"/>
-              <a:t>2019/10/5</a:t>
+              <a:t>2019/10/9</a:t>
             </a:fld>
             <a:endParaRPr lang="zh-CN" altLang="en-US"/>
           </a:p>
@@ -1792,11 +2352,6 @@
         </p:txBody>
       </p:sp>
     </p:spTree>
-    <p:extLst>
-      <p:ext uri="{BB962C8B-B14F-4D97-AF65-F5344CB8AC3E}">
-        <p14:creationId xmlns:p14="http://schemas.microsoft.com/office/powerpoint/2010/main" val="1808071114"/>
-      </p:ext>
-    </p:extLst>
   </p:cSld>
   <p:clrMapOvr>
     <a:masterClrMapping/>
@@ -2057,7 +2612,7 @@
           <a:p>
             <a:fld id="{90E67F42-795B-4328-A964-F7071B005671}" type="datetimeFigureOut">
               <a:rPr lang="zh-CN" altLang="en-US" smtClean="0"/>
-              <a:t>2019/10/5</a:t>
+              <a:t>2019/10/9</a:t>
             </a:fld>
             <a:endParaRPr lang="zh-CN" altLang="en-US"/>
           </a:p>
@@ -2136,7 +2691,7 @@
                   <a:schemeClr val="accent1"/>
                 </a:solidFill>
                 <a:effectLst/>
-                <a:latin typeface="Arial"/>
+                <a:latin typeface="Arial" panose="020B0604020202020204"/>
               </a:rPr>
               <a:t>“</a:t>
             </a:r>
@@ -2174,7 +2729,7 @@
                   <a:schemeClr val="accent1"/>
                 </a:solidFill>
                 <a:effectLst/>
-                <a:latin typeface="Arial"/>
+                <a:latin typeface="Arial" panose="020B0604020202020204"/>
               </a:rPr>
               <a:t>”</a:t>
             </a:r>
@@ -2182,11 +2737,6 @@
         </p:txBody>
       </p:sp>
     </p:spTree>
-    <p:extLst>
-      <p:ext uri="{BB962C8B-B14F-4D97-AF65-F5344CB8AC3E}">
-        <p14:creationId xmlns:p14="http://schemas.microsoft.com/office/powerpoint/2010/main" val="220015650"/>
-      </p:ext>
-    </p:extLst>
   </p:cSld>
   <p:clrMapOvr>
     <a:masterClrMapping/>
@@ -2444,7 +2994,7 @@
           <a:p>
             <a:fld id="{90E67F42-795B-4328-A964-F7071B005671}" type="datetimeFigureOut">
               <a:rPr lang="zh-CN" altLang="en-US" smtClean="0"/>
-              <a:t>2019/10/5</a:t>
+              <a:t>2019/10/9</a:t>
             </a:fld>
             <a:endParaRPr lang="zh-CN" altLang="en-US"/>
           </a:p>
@@ -2493,11 +3043,6 @@
         </p:txBody>
       </p:sp>
     </p:spTree>
-    <p:extLst>
-      <p:ext uri="{BB962C8B-B14F-4D97-AF65-F5344CB8AC3E}">
-        <p14:creationId xmlns:p14="http://schemas.microsoft.com/office/powerpoint/2010/main" val="806731182"/>
-      </p:ext>
-    </p:extLst>
   </p:cSld>
   <p:clrMapOvr>
     <a:masterClrMapping/>
@@ -2614,7 +3159,7 @@
           <a:p>
             <a:fld id="{90E67F42-795B-4328-A964-F7071B005671}" type="datetimeFigureOut">
               <a:rPr lang="zh-CN" altLang="en-US" smtClean="0"/>
-              <a:t>2019/10/5</a:t>
+              <a:t>2019/10/9</a:t>
             </a:fld>
             <a:endParaRPr lang="zh-CN" altLang="en-US"/>
           </a:p>
@@ -2663,11 +3208,6 @@
         </p:txBody>
       </p:sp>
     </p:spTree>
-    <p:extLst>
-      <p:ext uri="{BB962C8B-B14F-4D97-AF65-F5344CB8AC3E}">
-        <p14:creationId xmlns:p14="http://schemas.microsoft.com/office/powerpoint/2010/main" val="1975201226"/>
-      </p:ext>
-    </p:extLst>
   </p:cSld>
   <p:clrMapOvr>
     <a:masterClrMapping/>
@@ -2794,7 +3334,7 @@
           <a:p>
             <a:fld id="{90E67F42-795B-4328-A964-F7071B005671}" type="datetimeFigureOut">
               <a:rPr lang="zh-CN" altLang="en-US" smtClean="0"/>
-              <a:t>2019/10/5</a:t>
+              <a:t>2019/10/9</a:t>
             </a:fld>
             <a:endParaRPr lang="zh-CN" altLang="en-US"/>
           </a:p>
@@ -2843,11 +3383,6 @@
         </p:txBody>
       </p:sp>
     </p:spTree>
-    <p:extLst>
-      <p:ext uri="{BB962C8B-B14F-4D97-AF65-F5344CB8AC3E}">
-        <p14:creationId xmlns:p14="http://schemas.microsoft.com/office/powerpoint/2010/main" val="3035030340"/>
-      </p:ext>
-    </p:extLst>
   </p:cSld>
   <p:clrMapOvr>
     <a:masterClrMapping/>
@@ -2970,7 +3505,7 @@
           <a:p>
             <a:fld id="{90E67F42-795B-4328-A964-F7071B005671}" type="datetimeFigureOut">
               <a:rPr lang="zh-CN" altLang="en-US" smtClean="0"/>
-              <a:t>2019/10/5</a:t>
+              <a:t>2019/10/9</a:t>
             </a:fld>
             <a:endParaRPr lang="zh-CN" altLang="en-US"/>
           </a:p>
@@ -3019,11 +3554,6 @@
         </p:txBody>
       </p:sp>
     </p:spTree>
-    <p:extLst>
-      <p:ext uri="{BB962C8B-B14F-4D97-AF65-F5344CB8AC3E}">
-        <p14:creationId xmlns:p14="http://schemas.microsoft.com/office/powerpoint/2010/main" val="3643518316"/>
-      </p:ext>
-    </p:extLst>
   </p:cSld>
   <p:clrMapOvr>
     <a:masterClrMapping/>
@@ -3217,7 +3747,7 @@
           <a:p>
             <a:fld id="{90E67F42-795B-4328-A964-F7071B005671}" type="datetimeFigureOut">
               <a:rPr lang="zh-CN" altLang="en-US" smtClean="0"/>
-              <a:t>2019/10/5</a:t>
+              <a:t>2019/10/9</a:t>
             </a:fld>
             <a:endParaRPr lang="zh-CN" altLang="en-US"/>
           </a:p>
@@ -3266,11 +3796,6 @@
         </p:txBody>
       </p:sp>
     </p:spTree>
-    <p:extLst>
-      <p:ext uri="{BB962C8B-B14F-4D97-AF65-F5344CB8AC3E}">
-        <p14:creationId xmlns:p14="http://schemas.microsoft.com/office/powerpoint/2010/main" val="2992258406"/>
-      </p:ext>
-    </p:extLst>
   </p:cSld>
   <p:clrMapOvr>
     <a:masterClrMapping/>
@@ -3449,7 +3974,7 @@
           <a:p>
             <a:fld id="{90E67F42-795B-4328-A964-F7071B005671}" type="datetimeFigureOut">
               <a:rPr lang="zh-CN" altLang="en-US" smtClean="0"/>
-              <a:t>2019/10/5</a:t>
+              <a:t>2019/10/9</a:t>
             </a:fld>
             <a:endParaRPr lang="zh-CN" altLang="en-US"/>
           </a:p>
@@ -3498,11 +4023,6 @@
         </p:txBody>
       </p:sp>
     </p:spTree>
-    <p:extLst>
-      <p:ext uri="{BB962C8B-B14F-4D97-AF65-F5344CB8AC3E}">
-        <p14:creationId xmlns:p14="http://schemas.microsoft.com/office/powerpoint/2010/main" val="1234150936"/>
-      </p:ext>
-    </p:extLst>
   </p:cSld>
   <p:clrMapOvr>
     <a:masterClrMapping/>
@@ -3823,7 +4343,7 @@
           <a:p>
             <a:fld id="{90E67F42-795B-4328-A964-F7071B005671}" type="datetimeFigureOut">
               <a:rPr lang="zh-CN" altLang="en-US" smtClean="0"/>
-              <a:t>2019/10/5</a:t>
+              <a:t>2019/10/9</a:t>
             </a:fld>
             <a:endParaRPr lang="zh-CN" altLang="en-US"/>
           </a:p>
@@ -3872,11 +4392,6 @@
         </p:txBody>
       </p:sp>
     </p:spTree>
-    <p:extLst>
-      <p:ext uri="{BB962C8B-B14F-4D97-AF65-F5344CB8AC3E}">
-        <p14:creationId xmlns:p14="http://schemas.microsoft.com/office/powerpoint/2010/main" val="4285216943"/>
-      </p:ext>
-    </p:extLst>
   </p:cSld>
   <p:clrMapOvr>
     <a:masterClrMapping/>
@@ -3946,7 +4461,7 @@
           <a:p>
             <a:fld id="{90E67F42-795B-4328-A964-F7071B005671}" type="datetimeFigureOut">
               <a:rPr lang="zh-CN" altLang="en-US" smtClean="0"/>
-              <a:t>2019/10/5</a:t>
+              <a:t>2019/10/9</a:t>
             </a:fld>
             <a:endParaRPr lang="zh-CN" altLang="en-US"/>
           </a:p>
@@ -3995,11 +4510,6 @@
         </p:txBody>
       </p:sp>
     </p:spTree>
-    <p:extLst>
-      <p:ext uri="{BB962C8B-B14F-4D97-AF65-F5344CB8AC3E}">
-        <p14:creationId xmlns:p14="http://schemas.microsoft.com/office/powerpoint/2010/main" val="414265394"/>
-      </p:ext>
-    </p:extLst>
   </p:cSld>
   <p:clrMapOvr>
     <a:masterClrMapping/>
@@ -4041,7 +4551,7 @@
           <a:p>
             <a:fld id="{90E67F42-795B-4328-A964-F7071B005671}" type="datetimeFigureOut">
               <a:rPr lang="zh-CN" altLang="en-US" smtClean="0"/>
-              <a:t>2019/10/5</a:t>
+              <a:t>2019/10/9</a:t>
             </a:fld>
             <a:endParaRPr lang="zh-CN" altLang="en-US"/>
           </a:p>
@@ -4090,11 +4600,6 @@
         </p:txBody>
       </p:sp>
     </p:spTree>
-    <p:extLst>
-      <p:ext uri="{BB962C8B-B14F-4D97-AF65-F5344CB8AC3E}">
-        <p14:creationId xmlns:p14="http://schemas.microsoft.com/office/powerpoint/2010/main" val="1871098367"/>
-      </p:ext>
-    </p:extLst>
   </p:cSld>
   <p:clrMapOvr>
     <a:masterClrMapping/>
@@ -4237,35 +4742,35 @@
               <a:buNone/>
               <a:defRPr sz="1400"/>
             </a:lvl1pPr>
-            <a:lvl2pPr marL="457063" indent="0">
+            <a:lvl2pPr marL="457200" indent="0">
               <a:buNone/>
               <a:defRPr sz="1400"/>
             </a:lvl2pPr>
-            <a:lvl3pPr marL="914126" indent="0">
+            <a:lvl3pPr marL="914400" indent="0">
               <a:buNone/>
               <a:defRPr sz="1200"/>
             </a:lvl3pPr>
-            <a:lvl4pPr marL="1371189" indent="0">
+            <a:lvl4pPr marL="1370965" indent="0">
               <a:buNone/>
               <a:defRPr sz="1000"/>
             </a:lvl4pPr>
-            <a:lvl5pPr marL="1828251" indent="0">
+            <a:lvl5pPr marL="1828165" indent="0">
               <a:buNone/>
               <a:defRPr sz="1000"/>
             </a:lvl5pPr>
-            <a:lvl6pPr marL="2285314" indent="0">
+            <a:lvl6pPr marL="2285365" indent="0">
               <a:buNone/>
               <a:defRPr sz="1000"/>
             </a:lvl6pPr>
-            <a:lvl7pPr marL="2742377" indent="0">
+            <a:lvl7pPr marL="2742565" indent="0">
               <a:buNone/>
               <a:defRPr sz="1000"/>
             </a:lvl7pPr>
-            <a:lvl8pPr marL="3199440" indent="0">
+            <a:lvl8pPr marL="3199130" indent="0">
               <a:buNone/>
               <a:defRPr sz="1000"/>
             </a:lvl8pPr>
-            <a:lvl9pPr marL="3656503" indent="0">
+            <a:lvl9pPr marL="3656330" indent="0">
               <a:buNone/>
               <a:defRPr sz="1000"/>
             </a:lvl9pPr>
@@ -4296,7 +4801,7 @@
           <a:p>
             <a:fld id="{90E67F42-795B-4328-A964-F7071B005671}" type="datetimeFigureOut">
               <a:rPr lang="zh-CN" altLang="en-US" smtClean="0"/>
-              <a:t>2019/10/5</a:t>
+              <a:t>2019/10/9</a:t>
             </a:fld>
             <a:endParaRPr lang="zh-CN" altLang="en-US"/>
           </a:p>
@@ -4345,11 +4850,6 @@
         </p:txBody>
       </p:sp>
     </p:spTree>
-    <p:extLst>
-      <p:ext uri="{BB962C8B-B14F-4D97-AF65-F5344CB8AC3E}">
-        <p14:creationId xmlns:p14="http://schemas.microsoft.com/office/powerpoint/2010/main" val="674803067"/>
-      </p:ext>
-    </p:extLst>
   </p:cSld>
   <p:clrMapOvr>
     <a:masterClrMapping/>
@@ -4559,7 +5059,7 @@
           <a:p>
             <a:fld id="{90E67F42-795B-4328-A964-F7071B005671}" type="datetimeFigureOut">
               <a:rPr lang="zh-CN" altLang="en-US" smtClean="0"/>
-              <a:t>2019/10/5</a:t>
+              <a:t>2019/10/9</a:t>
             </a:fld>
             <a:endParaRPr lang="zh-CN" altLang="en-US"/>
           </a:p>
@@ -4608,11 +5108,6 @@
         </p:txBody>
       </p:sp>
     </p:spTree>
-    <p:extLst>
-      <p:ext uri="{BB962C8B-B14F-4D97-AF65-F5344CB8AC3E}">
-        <p14:creationId xmlns:p14="http://schemas.microsoft.com/office/powerpoint/2010/main" val="3418486067"/>
-      </p:ext>
-    </p:extLst>
   </p:cSld>
   <p:clrMapOvr>
     <a:masterClrMapping/>
@@ -5304,7 +5799,7 @@
           <a:p>
             <a:fld id="{90E67F42-795B-4328-A964-F7071B005671}" type="datetimeFigureOut">
               <a:rPr lang="zh-CN" altLang="en-US" smtClean="0"/>
-              <a:t>2019/10/5</a:t>
+              <a:t>2019/10/9</a:t>
             </a:fld>
             <a:endParaRPr lang="zh-CN" altLang="en-US"/>
           </a:p>
@@ -5387,30 +5882,25 @@
         </p:txBody>
       </p:sp>
     </p:spTree>
-    <p:extLst>
-      <p:ext uri="{BB962C8B-B14F-4D97-AF65-F5344CB8AC3E}">
-        <p14:creationId xmlns:p14="http://schemas.microsoft.com/office/powerpoint/2010/main" val="2438052046"/>
-      </p:ext>
-    </p:extLst>
   </p:cSld>
   <p:clrMap bg1="dk1" tx1="lt1" bg2="dk2" tx2="lt2" accent1="accent1" accent2="accent2" accent3="accent3" accent4="accent4" accent5="accent5" accent6="accent6" hlink="hlink" folHlink="folHlink"/>
   <p:sldLayoutIdLst>
-    <p:sldLayoutId id="2147483935" r:id="rId1"/>
-    <p:sldLayoutId id="2147483936" r:id="rId2"/>
-    <p:sldLayoutId id="2147483937" r:id="rId3"/>
-    <p:sldLayoutId id="2147483938" r:id="rId4"/>
-    <p:sldLayoutId id="2147483939" r:id="rId5"/>
-    <p:sldLayoutId id="2147483940" r:id="rId6"/>
-    <p:sldLayoutId id="2147483941" r:id="rId7"/>
-    <p:sldLayoutId id="2147483942" r:id="rId8"/>
-    <p:sldLayoutId id="2147483943" r:id="rId9"/>
-    <p:sldLayoutId id="2147483944" r:id="rId10"/>
-    <p:sldLayoutId id="2147483945" r:id="rId11"/>
-    <p:sldLayoutId id="2147483946" r:id="rId12"/>
-    <p:sldLayoutId id="2147483947" r:id="rId13"/>
-    <p:sldLayoutId id="2147483948" r:id="rId14"/>
-    <p:sldLayoutId id="2147483949" r:id="rId15"/>
-    <p:sldLayoutId id="2147483950" r:id="rId16"/>
+    <p:sldLayoutId id="2147483649" r:id="rId1"/>
+    <p:sldLayoutId id="2147483650" r:id="rId2"/>
+    <p:sldLayoutId id="2147483651" r:id="rId3"/>
+    <p:sldLayoutId id="2147483652" r:id="rId4"/>
+    <p:sldLayoutId id="2147483653" r:id="rId5"/>
+    <p:sldLayoutId id="2147483654" r:id="rId6"/>
+    <p:sldLayoutId id="2147483655" r:id="rId7"/>
+    <p:sldLayoutId id="2147483656" r:id="rId8"/>
+    <p:sldLayoutId id="2147483657" r:id="rId9"/>
+    <p:sldLayoutId id="2147483658" r:id="rId10"/>
+    <p:sldLayoutId id="2147483659" r:id="rId11"/>
+    <p:sldLayoutId id="2147483660" r:id="rId12"/>
+    <p:sldLayoutId id="2147483661" r:id="rId13"/>
+    <p:sldLayoutId id="2147483662" r:id="rId14"/>
+    <p:sldLayoutId id="2147483663" r:id="rId15"/>
+    <p:sldLayoutId id="2147483664" r:id="rId16"/>
   </p:sldLayoutIdLst>
   <p:txStyles>
     <p:titleStyle>
@@ -5808,11 +6298,6 @@
       </a:lvl9pPr>
     </p:otherStyle>
   </p:txStyles>
-  <p:extLst>
-    <p:ext uri="{27BBF7A9-308A-43DC-89C8-2F10F3537804}">
-      <p15:sldGuideLst xmlns:p15="http://schemas.microsoft.com/office/powerpoint/2012/main"/>
-    </p:ext>
-  </p:extLst>
 </p:sldMaster>
 </file>
 
@@ -5835,13 +6320,7 @@
       </p:grpSpPr>
       <p:sp>
         <p:nvSpPr>
-          <p:cNvPr id="2" name="标题 1">
-            <a:extLst>
-              <a:ext uri="{FF2B5EF4-FFF2-40B4-BE49-F238E27FC236}">
-                <a16:creationId xmlns:a16="http://schemas.microsoft.com/office/drawing/2014/main" id="{97C5A27B-884C-4BE4-B96F-49A4CC19F386}"/>
-              </a:ext>
-            </a:extLst>
-          </p:cNvPr>
+          <p:cNvPr id="2" name="标题 1"/>
           <p:cNvSpPr>
             <a:spLocks noGrp="1"/>
           </p:cNvSpPr>
@@ -5883,13 +6362,7 @@
       </p:sp>
       <p:sp>
         <p:nvSpPr>
-          <p:cNvPr id="3" name="副标题 2">
-            <a:extLst>
-              <a:ext uri="{FF2B5EF4-FFF2-40B4-BE49-F238E27FC236}">
-                <a16:creationId xmlns:a16="http://schemas.microsoft.com/office/drawing/2014/main" id="{5A0BD846-093B-4CBF-9974-8200A81FF6F4}"/>
-              </a:ext>
-            </a:extLst>
-          </p:cNvPr>
+          <p:cNvPr id="3" name="副标题 2"/>
           <p:cNvSpPr>
             <a:spLocks noGrp="1"/>
           </p:cNvSpPr>
@@ -6135,11 +6608,6 @@
         </p:txBody>
       </p:sp>
     </p:spTree>
-    <p:extLst>
-      <p:ext uri="{BB962C8B-B14F-4D97-AF65-F5344CB8AC3E}">
-        <p14:creationId xmlns:p14="http://schemas.microsoft.com/office/powerpoint/2010/main" val="1411641478"/>
-      </p:ext>
-    </p:extLst>
   </p:cSld>
   <p:clrMapOvr>
     <a:masterClrMapping/>
@@ -6166,13 +6634,7 @@
       </p:grpSpPr>
       <p:sp>
         <p:nvSpPr>
-          <p:cNvPr id="2" name="标题 1">
-            <a:extLst>
-              <a:ext uri="{FF2B5EF4-FFF2-40B4-BE49-F238E27FC236}">
-                <a16:creationId xmlns:a16="http://schemas.microsoft.com/office/drawing/2014/main" id="{DD1FCACC-76DC-4AA0-8059-A13D31EB3418}"/>
-              </a:ext>
-            </a:extLst>
-          </p:cNvPr>
+          <p:cNvPr id="2" name="标题 1"/>
           <p:cNvSpPr>
             <a:spLocks noGrp="1"/>
           </p:cNvSpPr>
@@ -6187,7 +6649,7 @@
           <a:p>
             <a:r>
               <a:rPr lang="en-US" altLang="zh-CN" dirty="0"/>
-              <a:t>Techniques</a:t>
+              <a:t>Feature Description – Staff Group</a:t>
             </a:r>
             <a:endParaRPr lang="zh-CN" altLang="en-US" dirty="0"/>
           </a:p>
@@ -6195,13 +6657,7 @@
       </p:sp>
       <p:sp>
         <p:nvSpPr>
-          <p:cNvPr id="3" name="内容占位符 2">
-            <a:extLst>
-              <a:ext uri="{FF2B5EF4-FFF2-40B4-BE49-F238E27FC236}">
-                <a16:creationId xmlns:a16="http://schemas.microsoft.com/office/drawing/2014/main" id="{D858CA24-E962-4B24-8BE9-E72DE30FD89E}"/>
-              </a:ext>
-            </a:extLst>
-          </p:cNvPr>
+          <p:cNvPr id="3" name="内容占位符 2"/>
           <p:cNvSpPr>
             <a:spLocks noGrp="1"/>
           </p:cNvSpPr>
@@ -6209,120 +6665,79 @@
             <p:ph idx="1"/>
           </p:nvPr>
         </p:nvSpPr>
-        <p:spPr/>
-        <p:txBody>
-          <a:bodyPr/>
-          <a:lstStyle/>
-          <a:p>
-            <a:r>
-              <a:rPr lang="en-US" altLang="zh-CN" dirty="0"/>
-              <a:t>Server : Apache + PHP + MySQL</a:t>
-            </a:r>
-          </a:p>
-          <a:p>
-            <a:pPr marL="0" indent="0">
-              <a:buNone/>
-            </a:pPr>
-            <a:endParaRPr lang="zh-CN" altLang="en-US" dirty="0"/>
-          </a:p>
-        </p:txBody>
-      </p:sp>
-      <p:pic>
-        <p:nvPicPr>
-          <p:cNvPr id="4" name="图片 3">
-            <a:extLst>
-              <a:ext uri="{FF2B5EF4-FFF2-40B4-BE49-F238E27FC236}">
-                <a16:creationId xmlns:a16="http://schemas.microsoft.com/office/drawing/2014/main" id="{F60D5388-9FD6-48F7-B1BD-842B644B8A1E}"/>
-              </a:ext>
-            </a:extLst>
-          </p:cNvPr>
-          <p:cNvPicPr>
-            <a:picLocks noChangeAspect="1"/>
-          </p:cNvPicPr>
-          <p:nvPr/>
-        </p:nvPicPr>
-        <p:blipFill>
-          <a:blip r:embed="rId2"/>
-          <a:stretch>
-            <a:fillRect/>
-          </a:stretch>
-        </p:blipFill>
         <p:spPr>
           <a:xfrm>
-            <a:off x="990354" y="2975826"/>
-            <a:ext cx="2028825" cy="1962150"/>
+            <a:off x="677334" y="2160589"/>
+            <a:ext cx="8596668" cy="3880773"/>
           </a:xfrm>
-          <a:prstGeom prst="rect">
-            <a:avLst/>
-          </a:prstGeom>
         </p:spPr>
-      </p:pic>
-      <p:pic>
-        <p:nvPicPr>
-          <p:cNvPr id="5" name="图片 4">
-            <a:extLst>
-              <a:ext uri="{FF2B5EF4-FFF2-40B4-BE49-F238E27FC236}">
-                <a16:creationId xmlns:a16="http://schemas.microsoft.com/office/drawing/2014/main" id="{08352CC7-49B5-431A-B1D0-9A36B5BAE2C4}"/>
-              </a:ext>
-            </a:extLst>
-          </p:cNvPr>
-          <p:cNvPicPr>
-            <a:picLocks noChangeAspect="1"/>
-          </p:cNvPicPr>
-          <p:nvPr/>
-        </p:nvPicPr>
-        <p:blipFill>
-          <a:blip r:embed="rId3"/>
-          <a:stretch>
-            <a:fillRect/>
-          </a:stretch>
-        </p:blipFill>
-        <p:spPr>
-          <a:xfrm>
-            <a:off x="6334812" y="2964018"/>
-            <a:ext cx="3007739" cy="1963583"/>
-          </a:xfrm>
-          <a:prstGeom prst="rect">
-            <a:avLst/>
-          </a:prstGeom>
-        </p:spPr>
-      </p:pic>
-      <p:pic>
-        <p:nvPicPr>
-          <p:cNvPr id="6" name="图片 5">
-            <a:extLst>
-              <a:ext uri="{FF2B5EF4-FFF2-40B4-BE49-F238E27FC236}">
-                <a16:creationId xmlns:a16="http://schemas.microsoft.com/office/drawing/2014/main" id="{7A5D0D22-7B5A-445D-B91A-42241712B6BE}"/>
-              </a:ext>
-            </a:extLst>
-          </p:cNvPr>
-          <p:cNvPicPr>
-            <a:picLocks noChangeAspect="1"/>
-          </p:cNvPicPr>
-          <p:nvPr/>
-        </p:nvPicPr>
-        <p:blipFill>
-          <a:blip r:embed="rId4"/>
-          <a:stretch>
-            <a:fillRect/>
-          </a:stretch>
-        </p:blipFill>
-        <p:spPr>
-          <a:xfrm>
-            <a:off x="3019179" y="2968882"/>
-            <a:ext cx="3315633" cy="1969094"/>
-          </a:xfrm>
-          <a:prstGeom prst="rect">
-            <a:avLst/>
-          </a:prstGeom>
-        </p:spPr>
-      </p:pic>
+        <p:txBody>
+          <a:bodyPr/>
+          <a:lstStyle/>
+          <a:p>
+            <a:r>
+              <a:rPr lang="en-US" altLang="zh-CN" dirty="0"/>
+              <a:t>General</a:t>
+            </a:r>
+          </a:p>
+          <a:p>
+            <a:pPr lvl="1"/>
+            <a:r>
+              <a:rPr lang="en-US" altLang="zh-CN" dirty="0"/>
+              <a:t>Check all the course schemas</a:t>
+            </a:r>
+          </a:p>
+          <a:p>
+            <a:pPr lvl="1"/>
+            <a:r>
+              <a:rPr lang="en-US" altLang="zh-CN" dirty="0"/>
+              <a:t>Check his/her visible students’ information</a:t>
+            </a:r>
+          </a:p>
+          <a:p>
+            <a:r>
+              <a:rPr lang="en-US" altLang="zh-CN" dirty="0"/>
+              <a:t>Secretary</a:t>
+            </a:r>
+          </a:p>
+          <a:p>
+            <a:pPr lvl="1"/>
+            <a:r>
+              <a:rPr lang="en-US" altLang="zh-CN" dirty="0"/>
+              <a:t>Upload course schemas (Request)</a:t>
+            </a:r>
+          </a:p>
+          <a:p>
+            <a:pPr lvl="1"/>
+            <a:r>
+              <a:rPr lang="en-US" altLang="zh-CN" dirty="0"/>
+              <a:t>Edit course schemas online (Request)</a:t>
+            </a:r>
+          </a:p>
+          <a:p>
+            <a:pPr lvl="1"/>
+            <a:r>
+              <a:rPr lang="en-US" altLang="zh-CN" dirty="0"/>
+              <a:t>Delete course schemas (Request)</a:t>
+            </a:r>
+          </a:p>
+          <a:p>
+            <a:pPr lvl="1"/>
+            <a:r>
+              <a:rPr lang="en-US" altLang="zh-CN" dirty="0"/>
+              <a:t>Contact Administrators</a:t>
+            </a:r>
+          </a:p>
+          <a:p>
+            <a:pPr lvl="1"/>
+            <a:r>
+              <a:rPr lang="en-US" altLang="zh-CN" dirty="0"/>
+              <a:t>Assign course schemas to students (Request)</a:t>
+            </a:r>
+          </a:p>
+        </p:txBody>
+      </p:sp>
     </p:spTree>
-    <p:extLst>
-      <p:ext uri="{BB962C8B-B14F-4D97-AF65-F5344CB8AC3E}">
-        <p14:creationId xmlns:p14="http://schemas.microsoft.com/office/powerpoint/2010/main" val="2041089768"/>
-      </p:ext>
-    </p:extLst>
   </p:cSld>
   <p:clrMapOvr>
     <a:masterClrMapping/>
@@ -6349,13 +6764,7 @@
       </p:grpSpPr>
       <p:sp>
         <p:nvSpPr>
-          <p:cNvPr id="2" name="标题 1">
-            <a:extLst>
-              <a:ext uri="{FF2B5EF4-FFF2-40B4-BE49-F238E27FC236}">
-                <a16:creationId xmlns:a16="http://schemas.microsoft.com/office/drawing/2014/main" id="{DD1FCACC-76DC-4AA0-8059-A13D31EB3418}"/>
-              </a:ext>
-            </a:extLst>
-          </p:cNvPr>
+          <p:cNvPr id="2" name="标题 1"/>
           <p:cNvSpPr>
             <a:spLocks noGrp="1"/>
           </p:cNvSpPr>
@@ -6370,7 +6779,7 @@
           <a:p>
             <a:r>
               <a:rPr lang="en-US" altLang="zh-CN" dirty="0"/>
-              <a:t>Techniques</a:t>
+              <a:t>Feature Description – Staff Group</a:t>
             </a:r>
             <a:endParaRPr lang="zh-CN" altLang="en-US" dirty="0"/>
           </a:p>
@@ -6378,13 +6787,7 @@
       </p:sp>
       <p:sp>
         <p:nvSpPr>
-          <p:cNvPr id="3" name="内容占位符 2">
-            <a:extLst>
-              <a:ext uri="{FF2B5EF4-FFF2-40B4-BE49-F238E27FC236}">
-                <a16:creationId xmlns:a16="http://schemas.microsoft.com/office/drawing/2014/main" id="{D858CA24-E962-4B24-8BE9-E72DE30FD89E}"/>
-              </a:ext>
-            </a:extLst>
-          </p:cNvPr>
+          <p:cNvPr id="3" name="内容占位符 2"/>
           <p:cNvSpPr>
             <a:spLocks noGrp="1"/>
           </p:cNvSpPr>
@@ -6392,25 +6795,66 @@
             <p:ph idx="1"/>
           </p:nvPr>
         </p:nvSpPr>
-        <p:spPr/>
+        <p:spPr>
+          <a:xfrm>
+            <a:off x="677334" y="2160589"/>
+            <a:ext cx="8596668" cy="3880773"/>
+          </a:xfrm>
+        </p:spPr>
         <p:txBody>
           <a:bodyPr/>
           <a:lstStyle/>
           <a:p>
             <a:r>
               <a:rPr lang="en-US" altLang="zh-CN" dirty="0"/>
-              <a:t>Client : JavaScript + HTML5 + CSS3 + …</a:t>
-            </a:r>
-            <a:endParaRPr lang="zh-CN" altLang="en-US" dirty="0"/>
+              <a:t>Teaching Affairs Department</a:t>
+            </a:r>
+          </a:p>
+          <a:p>
+            <a:pPr lvl="1"/>
+            <a:r>
+              <a:rPr lang="en-US" altLang="zh-CN" dirty="0"/>
+              <a:t>Create New Courses</a:t>
+            </a:r>
+          </a:p>
+          <a:p>
+            <a:pPr lvl="1"/>
+            <a:r>
+              <a:rPr lang="en-US" altLang="zh-CN" dirty="0"/>
+              <a:t>Synchronize course information</a:t>
+            </a:r>
+          </a:p>
+          <a:p>
+            <a:pPr lvl="1"/>
+            <a:r>
+              <a:rPr lang="en-US" altLang="zh-CN" dirty="0"/>
+              <a:t>Audit course schemas deletion</a:t>
+            </a:r>
+          </a:p>
+          <a:p>
+            <a:pPr lvl="1"/>
+            <a:r>
+              <a:rPr lang="en-US" altLang="zh-CN" dirty="0"/>
+              <a:t>Audit new course schemas</a:t>
+            </a:r>
+          </a:p>
+          <a:p>
+            <a:pPr lvl="1"/>
+            <a:r>
+              <a:rPr lang="en-US" altLang="zh-CN" dirty="0"/>
+              <a:t>Audit course schemas modifications</a:t>
+            </a:r>
+          </a:p>
+          <a:p>
+            <a:pPr lvl="1"/>
+            <a:r>
+              <a:rPr lang="en-US" altLang="zh-CN" dirty="0"/>
+              <a:t>Audit course schemas assignments</a:t>
+            </a:r>
           </a:p>
         </p:txBody>
       </p:sp>
     </p:spTree>
-    <p:extLst>
-      <p:ext uri="{BB962C8B-B14F-4D97-AF65-F5344CB8AC3E}">
-        <p14:creationId xmlns:p14="http://schemas.microsoft.com/office/powerpoint/2010/main" val="551399378"/>
-      </p:ext>
-    </p:extLst>
   </p:cSld>
   <p:clrMapOvr>
     <a:masterClrMapping/>
@@ -6437,13 +6881,117 @@
       </p:grpSpPr>
       <p:sp>
         <p:nvSpPr>
-          <p:cNvPr id="2" name="标题 1">
-            <a:extLst>
-              <a:ext uri="{FF2B5EF4-FFF2-40B4-BE49-F238E27FC236}">
-                <a16:creationId xmlns:a16="http://schemas.microsoft.com/office/drawing/2014/main" id="{DD1FCACC-76DC-4AA0-8059-A13D31EB3418}"/>
-              </a:ext>
-            </a:extLst>
-          </p:cNvPr>
+          <p:cNvPr id="2" name="标题 1"/>
+          <p:cNvSpPr>
+            <a:spLocks noGrp="1"/>
+          </p:cNvSpPr>
+          <p:nvPr>
+            <p:ph type="title"/>
+          </p:nvPr>
+        </p:nvSpPr>
+        <p:spPr/>
+        <p:txBody>
+          <a:bodyPr/>
+          <a:lstStyle/>
+          <a:p>
+            <a:r>
+              <a:rPr lang="en-US" altLang="zh-CN" dirty="0"/>
+              <a:t>Feature Description – Student Group</a:t>
+            </a:r>
+            <a:endParaRPr lang="zh-CN" altLang="en-US" dirty="0"/>
+          </a:p>
+        </p:txBody>
+      </p:sp>
+      <p:sp>
+        <p:nvSpPr>
+          <p:cNvPr id="3" name="内容占位符 2"/>
+          <p:cNvSpPr>
+            <a:spLocks noGrp="1"/>
+          </p:cNvSpPr>
+          <p:nvPr>
+            <p:ph idx="1"/>
+          </p:nvPr>
+        </p:nvSpPr>
+        <p:spPr>
+          <a:xfrm>
+            <a:off x="677334" y="2160589"/>
+            <a:ext cx="8596668" cy="3880773"/>
+          </a:xfrm>
+        </p:spPr>
+        <p:txBody>
+          <a:bodyPr/>
+          <a:lstStyle/>
+          <a:p>
+            <a:r>
+              <a:rPr lang="en-US" altLang="zh-CN" dirty="0"/>
+              <a:t>General</a:t>
+            </a:r>
+          </a:p>
+          <a:p>
+            <a:pPr lvl="1"/>
+            <a:r>
+              <a:rPr lang="en-US" altLang="zh-CN" dirty="0"/>
+              <a:t>Check all course schemas</a:t>
+            </a:r>
+          </a:p>
+          <a:p>
+            <a:pPr lvl="1"/>
+            <a:r>
+              <a:rPr lang="en-US" altLang="zh-CN" dirty="0"/>
+              <a:t>Check his/her own course schema</a:t>
+            </a:r>
+          </a:p>
+          <a:p>
+            <a:pPr lvl="1"/>
+            <a:r>
+              <a:rPr lang="en-US" altLang="zh-CN" dirty="0"/>
+              <a:t>Check “My Plan”</a:t>
+            </a:r>
+          </a:p>
+          <a:p>
+            <a:pPr lvl="1"/>
+            <a:r>
+              <a:rPr lang="en-US" altLang="zh-CN" dirty="0"/>
+              <a:t>Edit “My Plan”</a:t>
+            </a:r>
+          </a:p>
+          <a:p>
+            <a:pPr lvl="1"/>
+            <a:r>
+              <a:rPr lang="en-US" altLang="zh-CN" dirty="0"/>
+              <a:t>Collect course </a:t>
+            </a:r>
+          </a:p>
+        </p:txBody>
+      </p:sp>
+    </p:spTree>
+  </p:cSld>
+  <p:clrMapOvr>
+    <a:masterClrMapping/>
+  </p:clrMapOvr>
+</p:sld>
+</file>
+
+<file path=ppt/slides/slide13.xml><?xml version="1.0" encoding="utf-8"?>
+<p:sld xmlns:a="http://schemas.openxmlformats.org/drawingml/2006/main" xmlns:r="http://schemas.openxmlformats.org/officeDocument/2006/relationships" xmlns:p="http://schemas.openxmlformats.org/presentationml/2006/main">
+  <p:cSld>
+    <p:spTree>
+      <p:nvGrpSpPr>
+        <p:cNvPr id="1" name=""/>
+        <p:cNvGrpSpPr/>
+        <p:nvPr/>
+      </p:nvGrpSpPr>
+      <p:grpSpPr>
+        <a:xfrm>
+          <a:off x="0" y="0"/>
+          <a:ext cx="0" cy="0"/>
+          <a:chOff x="0" y="0"/>
+          <a:chExt cx="0" cy="0"/>
+        </a:xfrm>
+      </p:grpSpPr>
+      <p:sp>
+        <p:nvSpPr>
+          <p:cNvPr id="2" name="标题 1"/>
           <p:cNvSpPr>
             <a:spLocks noGrp="1"/>
           </p:cNvSpPr>
@@ -6466,13 +7014,412 @@
       </p:sp>
       <p:sp>
         <p:nvSpPr>
-          <p:cNvPr id="3" name="内容占位符 2">
-            <a:extLst>
-              <a:ext uri="{FF2B5EF4-FFF2-40B4-BE49-F238E27FC236}">
-                <a16:creationId xmlns:a16="http://schemas.microsoft.com/office/drawing/2014/main" id="{D858CA24-E962-4B24-8BE9-E72DE30FD89E}"/>
-              </a:ext>
-            </a:extLst>
-          </p:cNvPr>
+          <p:cNvPr id="3" name="内容占位符 2"/>
+          <p:cNvSpPr>
+            <a:spLocks noGrp="1"/>
+          </p:cNvSpPr>
+          <p:nvPr>
+            <p:ph idx="1"/>
+          </p:nvPr>
+        </p:nvSpPr>
+        <p:spPr>
+          <a:xfrm>
+            <a:off x="677334" y="1488613"/>
+            <a:ext cx="8596668" cy="3880773"/>
+          </a:xfrm>
+        </p:spPr>
+        <p:txBody>
+          <a:bodyPr/>
+          <a:lstStyle/>
+          <a:p>
+            <a:r>
+              <a:rPr lang="en-US" altLang="zh-CN" dirty="0"/>
+              <a:t>Teamwork Communication</a:t>
+            </a:r>
+          </a:p>
+          <a:p>
+            <a:endParaRPr lang="en-US" altLang="zh-CN" dirty="0"/>
+          </a:p>
+          <a:p>
+            <a:r>
+              <a:rPr lang="en-US" altLang="zh-CN" dirty="0"/>
+              <a:t>UML Development</a:t>
+            </a:r>
+          </a:p>
+          <a:p>
+            <a:endParaRPr lang="en-US" altLang="zh-CN" dirty="0"/>
+          </a:p>
+          <a:p>
+            <a:r>
+              <a:rPr lang="en-US" altLang="zh-CN" dirty="0"/>
+              <a:t>Code Management</a:t>
+            </a:r>
+          </a:p>
+          <a:p>
+            <a:pPr marL="0" indent="0">
+              <a:buNone/>
+            </a:pPr>
+            <a:r>
+              <a:rPr lang="en-US" altLang="zh-CN" dirty="0"/>
+              <a:t> </a:t>
+            </a:r>
+          </a:p>
+          <a:p>
+            <a:endParaRPr lang="en-US" altLang="zh-CN" dirty="0"/>
+          </a:p>
+          <a:p>
+            <a:endParaRPr lang="en-US" altLang="zh-CN" dirty="0"/>
+          </a:p>
+          <a:p>
+            <a:pPr marL="0" indent="0">
+              <a:buNone/>
+            </a:pPr>
+            <a:endParaRPr lang="zh-CN" altLang="en-US" dirty="0"/>
+          </a:p>
+        </p:txBody>
+      </p:sp>
+      <p:pic>
+        <p:nvPicPr>
+          <p:cNvPr id="8" name="图片 7"/>
+          <p:cNvPicPr>
+            <a:picLocks noChangeAspect="1"/>
+          </p:cNvPicPr>
+          <p:nvPr/>
+        </p:nvPicPr>
+        <p:blipFill>
+          <a:blip r:embed="rId2"/>
+          <a:stretch>
+            <a:fillRect/>
+          </a:stretch>
+        </p:blipFill>
+        <p:spPr>
+          <a:xfrm>
+            <a:off x="3925912" y="1449394"/>
+            <a:ext cx="1202270" cy="520293"/>
+          </a:xfrm>
+          <a:prstGeom prst="rect">
+            <a:avLst/>
+          </a:prstGeom>
+        </p:spPr>
+      </p:pic>
+      <p:pic>
+        <p:nvPicPr>
+          <p:cNvPr id="9" name="图片 8"/>
+          <p:cNvPicPr>
+            <a:picLocks noChangeAspect="1"/>
+          </p:cNvPicPr>
+          <p:nvPr/>
+        </p:nvPicPr>
+        <p:blipFill>
+          <a:blip r:embed="rId3"/>
+          <a:stretch>
+            <a:fillRect/>
+          </a:stretch>
+        </p:blipFill>
+        <p:spPr>
+          <a:xfrm>
+            <a:off x="3123659" y="2215151"/>
+            <a:ext cx="1476375" cy="485775"/>
+          </a:xfrm>
+          <a:prstGeom prst="rect">
+            <a:avLst/>
+          </a:prstGeom>
+        </p:spPr>
+      </p:pic>
+      <p:pic>
+        <p:nvPicPr>
+          <p:cNvPr id="10" name="图片 9"/>
+          <p:cNvPicPr>
+            <a:picLocks noChangeAspect="1"/>
+          </p:cNvPicPr>
+          <p:nvPr/>
+        </p:nvPicPr>
+        <p:blipFill>
+          <a:blip r:embed="rId4"/>
+          <a:stretch>
+            <a:fillRect/>
+          </a:stretch>
+        </p:blipFill>
+        <p:spPr>
+          <a:xfrm>
+            <a:off x="3123659" y="3009943"/>
+            <a:ext cx="1083156" cy="544559"/>
+          </a:xfrm>
+          <a:prstGeom prst="rect">
+            <a:avLst/>
+          </a:prstGeom>
+        </p:spPr>
+      </p:pic>
+    </p:spTree>
+  </p:cSld>
+  <p:clrMapOvr>
+    <a:masterClrMapping/>
+  </p:clrMapOvr>
+</p:sld>
+</file>
+
+<file path=ppt/slides/slide14.xml><?xml version="1.0" encoding="utf-8"?>
+<p:sld xmlns:a="http://schemas.openxmlformats.org/drawingml/2006/main" xmlns:r="http://schemas.openxmlformats.org/officeDocument/2006/relationships" xmlns:p="http://schemas.openxmlformats.org/presentationml/2006/main">
+  <p:cSld>
+    <p:spTree>
+      <p:nvGrpSpPr>
+        <p:cNvPr id="1" name=""/>
+        <p:cNvGrpSpPr/>
+        <p:nvPr/>
+      </p:nvGrpSpPr>
+      <p:grpSpPr>
+        <a:xfrm>
+          <a:off x="0" y="0"/>
+          <a:ext cx="0" cy="0"/>
+          <a:chOff x="0" y="0"/>
+          <a:chExt cx="0" cy="0"/>
+        </a:xfrm>
+      </p:grpSpPr>
+      <p:sp>
+        <p:nvSpPr>
+          <p:cNvPr id="2" name="标题 1"/>
+          <p:cNvSpPr>
+            <a:spLocks noGrp="1"/>
+          </p:cNvSpPr>
+          <p:nvPr>
+            <p:ph type="title"/>
+          </p:nvPr>
+        </p:nvSpPr>
+        <p:spPr/>
+        <p:txBody>
+          <a:bodyPr/>
+          <a:lstStyle/>
+          <a:p>
+            <a:r>
+              <a:rPr lang="en-US" altLang="zh-CN" dirty="0"/>
+              <a:t>Techniques</a:t>
+            </a:r>
+            <a:endParaRPr lang="zh-CN" altLang="en-US" dirty="0"/>
+          </a:p>
+        </p:txBody>
+      </p:sp>
+      <p:sp>
+        <p:nvSpPr>
+          <p:cNvPr id="3" name="内容占位符 2"/>
+          <p:cNvSpPr>
+            <a:spLocks noGrp="1"/>
+          </p:cNvSpPr>
+          <p:nvPr>
+            <p:ph idx="1"/>
+          </p:nvPr>
+        </p:nvSpPr>
+        <p:spPr/>
+        <p:txBody>
+          <a:bodyPr/>
+          <a:lstStyle/>
+          <a:p>
+            <a:r>
+              <a:rPr lang="en-US" altLang="zh-CN" dirty="0"/>
+              <a:t>Server : Apache + PHP + MySQL</a:t>
+            </a:r>
+          </a:p>
+          <a:p>
+            <a:pPr marL="0" indent="0">
+              <a:buNone/>
+            </a:pPr>
+            <a:endParaRPr lang="zh-CN" altLang="en-US" dirty="0"/>
+          </a:p>
+        </p:txBody>
+      </p:sp>
+      <p:pic>
+        <p:nvPicPr>
+          <p:cNvPr id="4" name="图片 3"/>
+          <p:cNvPicPr>
+            <a:picLocks noChangeAspect="1"/>
+          </p:cNvPicPr>
+          <p:nvPr/>
+        </p:nvPicPr>
+        <p:blipFill>
+          <a:blip r:embed="rId2"/>
+          <a:stretch>
+            <a:fillRect/>
+          </a:stretch>
+        </p:blipFill>
+        <p:spPr>
+          <a:xfrm>
+            <a:off x="990354" y="2975826"/>
+            <a:ext cx="2028825" cy="1962150"/>
+          </a:xfrm>
+          <a:prstGeom prst="rect">
+            <a:avLst/>
+          </a:prstGeom>
+        </p:spPr>
+      </p:pic>
+      <p:pic>
+        <p:nvPicPr>
+          <p:cNvPr id="5" name="图片 4"/>
+          <p:cNvPicPr>
+            <a:picLocks noChangeAspect="1"/>
+          </p:cNvPicPr>
+          <p:nvPr/>
+        </p:nvPicPr>
+        <p:blipFill>
+          <a:blip r:embed="rId3"/>
+          <a:stretch>
+            <a:fillRect/>
+          </a:stretch>
+        </p:blipFill>
+        <p:spPr>
+          <a:xfrm>
+            <a:off x="6334812" y="2964018"/>
+            <a:ext cx="3007739" cy="1963583"/>
+          </a:xfrm>
+          <a:prstGeom prst="rect">
+            <a:avLst/>
+          </a:prstGeom>
+        </p:spPr>
+      </p:pic>
+      <p:pic>
+        <p:nvPicPr>
+          <p:cNvPr id="6" name="图片 5"/>
+          <p:cNvPicPr>
+            <a:picLocks noChangeAspect="1"/>
+          </p:cNvPicPr>
+          <p:nvPr/>
+        </p:nvPicPr>
+        <p:blipFill>
+          <a:blip r:embed="rId4"/>
+          <a:stretch>
+            <a:fillRect/>
+          </a:stretch>
+        </p:blipFill>
+        <p:spPr>
+          <a:xfrm>
+            <a:off x="3019179" y="2968882"/>
+            <a:ext cx="3315633" cy="1969094"/>
+          </a:xfrm>
+          <a:prstGeom prst="rect">
+            <a:avLst/>
+          </a:prstGeom>
+        </p:spPr>
+      </p:pic>
+    </p:spTree>
+  </p:cSld>
+  <p:clrMapOvr>
+    <a:masterClrMapping/>
+  </p:clrMapOvr>
+</p:sld>
+</file>
+
+<file path=ppt/slides/slide15.xml><?xml version="1.0" encoding="utf-8"?>
+<p:sld xmlns:a="http://schemas.openxmlformats.org/drawingml/2006/main" xmlns:r="http://schemas.openxmlformats.org/officeDocument/2006/relationships" xmlns:p="http://schemas.openxmlformats.org/presentationml/2006/main">
+  <p:cSld>
+    <p:spTree>
+      <p:nvGrpSpPr>
+        <p:cNvPr id="1" name=""/>
+        <p:cNvGrpSpPr/>
+        <p:nvPr/>
+      </p:nvGrpSpPr>
+      <p:grpSpPr>
+        <a:xfrm>
+          <a:off x="0" y="0"/>
+          <a:ext cx="0" cy="0"/>
+          <a:chOff x="0" y="0"/>
+          <a:chExt cx="0" cy="0"/>
+        </a:xfrm>
+      </p:grpSpPr>
+      <p:sp>
+        <p:nvSpPr>
+          <p:cNvPr id="2" name="标题 1"/>
+          <p:cNvSpPr>
+            <a:spLocks noGrp="1"/>
+          </p:cNvSpPr>
+          <p:nvPr>
+            <p:ph type="title"/>
+          </p:nvPr>
+        </p:nvSpPr>
+        <p:spPr/>
+        <p:txBody>
+          <a:bodyPr/>
+          <a:lstStyle/>
+          <a:p>
+            <a:r>
+              <a:rPr lang="en-US" altLang="zh-CN" dirty="0"/>
+              <a:t>Techniques</a:t>
+            </a:r>
+            <a:endParaRPr lang="zh-CN" altLang="en-US" dirty="0"/>
+          </a:p>
+        </p:txBody>
+      </p:sp>
+      <p:sp>
+        <p:nvSpPr>
+          <p:cNvPr id="3" name="内容占位符 2"/>
+          <p:cNvSpPr>
+            <a:spLocks noGrp="1"/>
+          </p:cNvSpPr>
+          <p:nvPr>
+            <p:ph idx="1"/>
+          </p:nvPr>
+        </p:nvSpPr>
+        <p:spPr/>
+        <p:txBody>
+          <a:bodyPr/>
+          <a:lstStyle/>
+          <a:p>
+            <a:r>
+              <a:rPr lang="en-US" altLang="zh-CN" dirty="0"/>
+              <a:t>Client : JavaScript + HTML5 + CSS3 + …</a:t>
+            </a:r>
+            <a:endParaRPr lang="zh-CN" altLang="en-US" dirty="0"/>
+          </a:p>
+        </p:txBody>
+      </p:sp>
+    </p:spTree>
+  </p:cSld>
+  <p:clrMapOvr>
+    <a:masterClrMapping/>
+  </p:clrMapOvr>
+</p:sld>
+</file>
+
+<file path=ppt/slides/slide16.xml><?xml version="1.0" encoding="utf-8"?>
+<p:sld xmlns:a="http://schemas.openxmlformats.org/drawingml/2006/main" xmlns:r="http://schemas.openxmlformats.org/officeDocument/2006/relationships" xmlns:p="http://schemas.openxmlformats.org/presentationml/2006/main">
+  <p:cSld>
+    <p:spTree>
+      <p:nvGrpSpPr>
+        <p:cNvPr id="1" name=""/>
+        <p:cNvGrpSpPr/>
+        <p:nvPr/>
+      </p:nvGrpSpPr>
+      <p:grpSpPr>
+        <a:xfrm>
+          <a:off x="0" y="0"/>
+          <a:ext cx="0" cy="0"/>
+          <a:chOff x="0" y="0"/>
+          <a:chExt cx="0" cy="0"/>
+        </a:xfrm>
+      </p:grpSpPr>
+      <p:sp>
+        <p:nvSpPr>
+          <p:cNvPr id="2" name="标题 1"/>
+          <p:cNvSpPr>
+            <a:spLocks noGrp="1"/>
+          </p:cNvSpPr>
+          <p:nvPr>
+            <p:ph type="title"/>
+          </p:nvPr>
+        </p:nvSpPr>
+        <p:spPr/>
+        <p:txBody>
+          <a:bodyPr/>
+          <a:lstStyle/>
+          <a:p>
+            <a:r>
+              <a:rPr lang="en-US" altLang="zh-CN" dirty="0"/>
+              <a:t>Techniques</a:t>
+            </a:r>
+            <a:endParaRPr lang="zh-CN" altLang="en-US" dirty="0"/>
+          </a:p>
+        </p:txBody>
+      </p:sp>
+      <p:sp>
+        <p:nvSpPr>
+          <p:cNvPr id="3" name="内容占位符 2"/>
           <p:cNvSpPr>
             <a:spLocks noGrp="1"/>
           </p:cNvSpPr>
@@ -6500,13 +7447,7 @@
       </p:sp>
       <p:pic>
         <p:nvPicPr>
-          <p:cNvPr id="4" name="图片 3">
-            <a:extLst>
-              <a:ext uri="{FF2B5EF4-FFF2-40B4-BE49-F238E27FC236}">
-                <a16:creationId xmlns:a16="http://schemas.microsoft.com/office/drawing/2014/main" id="{ED97B9B1-DF71-4178-802F-0918D93F5048}"/>
-              </a:ext>
-            </a:extLst>
-          </p:cNvPr>
+          <p:cNvPr id="4" name="图片 3"/>
           <p:cNvPicPr>
             <a:picLocks noChangeAspect="1"/>
           </p:cNvPicPr>
@@ -6530,13 +7471,7 @@
       </p:pic>
       <p:pic>
         <p:nvPicPr>
-          <p:cNvPr id="7" name="图片 6">
-            <a:extLst>
-              <a:ext uri="{FF2B5EF4-FFF2-40B4-BE49-F238E27FC236}">
-                <a16:creationId xmlns:a16="http://schemas.microsoft.com/office/drawing/2014/main" id="{4F4D6733-FE55-4E80-A80C-5F0127D4F2BA}"/>
-              </a:ext>
-            </a:extLst>
-          </p:cNvPr>
+          <p:cNvPr id="7" name="图片 6"/>
           <p:cNvPicPr>
             <a:picLocks noChangeAspect="1"/>
           </p:cNvPicPr>
@@ -6565,11 +7500,6 @@
         </p:spPr>
       </p:pic>
     </p:spTree>
-    <p:extLst>
-      <p:ext uri="{BB962C8B-B14F-4D97-AF65-F5344CB8AC3E}">
-        <p14:creationId xmlns:p14="http://schemas.microsoft.com/office/powerpoint/2010/main" val="872120487"/>
-      </p:ext>
-    </p:extLst>
   </p:cSld>
   <p:clrMapOvr>
     <a:masterClrMapping/>
@@ -6577,7 +7507,7 @@
 </p:sld>
 </file>
 
-<file path=ppt/slides/slide13.xml><?xml version="1.0" encoding="utf-8"?>
+<file path=ppt/slides/slide17.xml><?xml version="1.0" encoding="utf-8"?>
 <p:sld xmlns:a="http://schemas.openxmlformats.org/drawingml/2006/main" xmlns:r="http://schemas.openxmlformats.org/officeDocument/2006/relationships" xmlns:p="http://schemas.openxmlformats.org/presentationml/2006/main">
   <p:cSld>
     <p:spTree>
@@ -6596,13 +7526,7 @@
       </p:grpSpPr>
       <p:sp>
         <p:nvSpPr>
-          <p:cNvPr id="2" name="标题 1">
-            <a:extLst>
-              <a:ext uri="{FF2B5EF4-FFF2-40B4-BE49-F238E27FC236}">
-                <a16:creationId xmlns:a16="http://schemas.microsoft.com/office/drawing/2014/main" id="{DD1FCACC-76DC-4AA0-8059-A13D31EB3418}"/>
-              </a:ext>
-            </a:extLst>
-          </p:cNvPr>
+          <p:cNvPr id="2" name="标题 1"/>
           <p:cNvSpPr>
             <a:spLocks noGrp="1"/>
           </p:cNvSpPr>
@@ -6625,13 +7549,7 @@
       </p:sp>
       <p:sp>
         <p:nvSpPr>
-          <p:cNvPr id="3" name="内容占位符 2">
-            <a:extLst>
-              <a:ext uri="{FF2B5EF4-FFF2-40B4-BE49-F238E27FC236}">
-                <a16:creationId xmlns:a16="http://schemas.microsoft.com/office/drawing/2014/main" id="{D858CA24-E962-4B24-8BE9-E72DE30FD89E}"/>
-              </a:ext>
-            </a:extLst>
-          </p:cNvPr>
+          <p:cNvPr id="3" name="内容占位符 2"/>
           <p:cNvSpPr>
             <a:spLocks noGrp="1"/>
           </p:cNvSpPr>
@@ -6659,13 +7577,7 @@
       </p:sp>
       <p:pic>
         <p:nvPicPr>
-          <p:cNvPr id="6" name="图片 5">
-            <a:extLst>
-              <a:ext uri="{FF2B5EF4-FFF2-40B4-BE49-F238E27FC236}">
-                <a16:creationId xmlns:a16="http://schemas.microsoft.com/office/drawing/2014/main" id="{7AFF1FBA-BF36-48E3-982F-ECC080F98D9A}"/>
-              </a:ext>
-            </a:extLst>
-          </p:cNvPr>
+          <p:cNvPr id="6" name="图片 5"/>
           <p:cNvPicPr>
             <a:picLocks noChangeAspect="1"/>
           </p:cNvPicPr>
@@ -6689,13 +7601,7 @@
       </p:pic>
       <p:pic>
         <p:nvPicPr>
-          <p:cNvPr id="7" name="内容占位符 3">
-            <a:extLst>
-              <a:ext uri="{FF2B5EF4-FFF2-40B4-BE49-F238E27FC236}">
-                <a16:creationId xmlns:a16="http://schemas.microsoft.com/office/drawing/2014/main" id="{30B5D94D-31BD-4301-95CF-D6F9D861665D}"/>
-              </a:ext>
-            </a:extLst>
-          </p:cNvPr>
+          <p:cNvPr id="7" name="内容占位符 3"/>
           <p:cNvPicPr>
             <a:picLocks noChangeAspect="1"/>
           </p:cNvPicPr>
@@ -6725,13 +7631,7 @@
       </p:pic>
       <p:pic>
         <p:nvPicPr>
-          <p:cNvPr id="8" name="图片 7">
-            <a:extLst>
-              <a:ext uri="{FF2B5EF4-FFF2-40B4-BE49-F238E27FC236}">
-                <a16:creationId xmlns:a16="http://schemas.microsoft.com/office/drawing/2014/main" id="{C713F7C1-2E46-4733-AF12-AD028F5CB8AC}"/>
-              </a:ext>
-            </a:extLst>
-          </p:cNvPr>
+          <p:cNvPr id="8" name="图片 7"/>
           <p:cNvPicPr>
             <a:picLocks noChangeAspect="1"/>
           </p:cNvPicPr>
@@ -6760,11 +7660,6 @@
         </p:spPr>
       </p:pic>
     </p:spTree>
-    <p:extLst>
-      <p:ext uri="{BB962C8B-B14F-4D97-AF65-F5344CB8AC3E}">
-        <p14:creationId xmlns:p14="http://schemas.microsoft.com/office/powerpoint/2010/main" val="1128519739"/>
-      </p:ext>
-    </p:extLst>
   </p:cSld>
   <p:clrMapOvr>
     <a:masterClrMapping/>
@@ -6772,7 +7667,7 @@
 </p:sld>
 </file>
 
-<file path=ppt/slides/slide14.xml><?xml version="1.0" encoding="utf-8"?>
+<file path=ppt/slides/slide18.xml><?xml version="1.0" encoding="utf-8"?>
 <p:sld xmlns:a="http://schemas.openxmlformats.org/drawingml/2006/main" xmlns:r="http://schemas.openxmlformats.org/officeDocument/2006/relationships" xmlns:p="http://schemas.openxmlformats.org/presentationml/2006/main">
   <p:cSld>
     <p:spTree>
@@ -6791,13 +7686,7 @@
       </p:grpSpPr>
       <p:sp>
         <p:nvSpPr>
-          <p:cNvPr id="2" name="标题 1">
-            <a:extLst>
-              <a:ext uri="{FF2B5EF4-FFF2-40B4-BE49-F238E27FC236}">
-                <a16:creationId xmlns:a16="http://schemas.microsoft.com/office/drawing/2014/main" id="{DD1FCACC-76DC-4AA0-8059-A13D31EB3418}"/>
-              </a:ext>
-            </a:extLst>
-          </p:cNvPr>
+          <p:cNvPr id="2" name="标题 1"/>
           <p:cNvSpPr>
             <a:spLocks noGrp="1"/>
           </p:cNvSpPr>
@@ -6820,13 +7709,7 @@
       </p:sp>
       <p:sp>
         <p:nvSpPr>
-          <p:cNvPr id="3" name="内容占位符 2">
-            <a:extLst>
-              <a:ext uri="{FF2B5EF4-FFF2-40B4-BE49-F238E27FC236}">
-                <a16:creationId xmlns:a16="http://schemas.microsoft.com/office/drawing/2014/main" id="{D858CA24-E962-4B24-8BE9-E72DE30FD89E}"/>
-              </a:ext>
-            </a:extLst>
-          </p:cNvPr>
+          <p:cNvPr id="3" name="内容占位符 2"/>
           <p:cNvSpPr>
             <a:spLocks noGrp="1"/>
           </p:cNvSpPr>
@@ -6859,13 +7742,7 @@
       </p:sp>
       <p:pic>
         <p:nvPicPr>
-          <p:cNvPr id="5" name="图片 4">
-            <a:extLst>
-              <a:ext uri="{FF2B5EF4-FFF2-40B4-BE49-F238E27FC236}">
-                <a16:creationId xmlns:a16="http://schemas.microsoft.com/office/drawing/2014/main" id="{2D1EC8F5-A0A8-4998-8F37-F04C8549FA63}"/>
-              </a:ext>
-            </a:extLst>
-          </p:cNvPr>
+          <p:cNvPr id="5" name="图片 4"/>
           <p:cNvPicPr>
             <a:picLocks noChangeAspect="1"/>
           </p:cNvPicPr>
@@ -6894,11 +7771,6 @@
         </p:spPr>
       </p:pic>
     </p:spTree>
-    <p:extLst>
-      <p:ext uri="{BB962C8B-B14F-4D97-AF65-F5344CB8AC3E}">
-        <p14:creationId xmlns:p14="http://schemas.microsoft.com/office/powerpoint/2010/main" val="446027679"/>
-      </p:ext>
-    </p:extLst>
   </p:cSld>
   <p:clrMapOvr>
     <a:masterClrMapping/>
@@ -6906,7 +7778,7 @@
 </p:sld>
 </file>
 
-<file path=ppt/slides/slide15.xml><?xml version="1.0" encoding="utf-8"?>
+<file path=ppt/slides/slide19.xml><?xml version="1.0" encoding="utf-8"?>
 <p:sld xmlns:a="http://schemas.openxmlformats.org/drawingml/2006/main" xmlns:r="http://schemas.openxmlformats.org/officeDocument/2006/relationships" xmlns:p="http://schemas.openxmlformats.org/presentationml/2006/main">
   <p:cSld>
     <p:spTree>
@@ -6925,13 +7797,7 @@
       </p:grpSpPr>
       <p:sp>
         <p:nvSpPr>
-          <p:cNvPr id="2" name="标题 1">
-            <a:extLst>
-              <a:ext uri="{FF2B5EF4-FFF2-40B4-BE49-F238E27FC236}">
-                <a16:creationId xmlns:a16="http://schemas.microsoft.com/office/drawing/2014/main" id="{DD1FCACC-76DC-4AA0-8059-A13D31EB3418}"/>
-              </a:ext>
-            </a:extLst>
-          </p:cNvPr>
+          <p:cNvPr id="2" name="标题 1"/>
           <p:cNvSpPr>
             <a:spLocks noGrp="1"/>
           </p:cNvSpPr>
@@ -6954,13 +7820,7 @@
       </p:sp>
       <p:sp>
         <p:nvSpPr>
-          <p:cNvPr id="3" name="内容占位符 2">
-            <a:extLst>
-              <a:ext uri="{FF2B5EF4-FFF2-40B4-BE49-F238E27FC236}">
-                <a16:creationId xmlns:a16="http://schemas.microsoft.com/office/drawing/2014/main" id="{D858CA24-E962-4B24-8BE9-E72DE30FD89E}"/>
-              </a:ext>
-            </a:extLst>
-          </p:cNvPr>
+          <p:cNvPr id="3" name="内容占位符 2"/>
           <p:cNvSpPr>
             <a:spLocks noGrp="1"/>
           </p:cNvSpPr>
@@ -6993,13 +7853,7 @@
       </p:sp>
       <p:pic>
         <p:nvPicPr>
-          <p:cNvPr id="6" name="图片 5">
-            <a:extLst>
-              <a:ext uri="{FF2B5EF4-FFF2-40B4-BE49-F238E27FC236}">
-                <a16:creationId xmlns:a16="http://schemas.microsoft.com/office/drawing/2014/main" id="{2996D559-D884-41FC-9542-A35ED322D473}"/>
-              </a:ext>
-            </a:extLst>
-          </p:cNvPr>
+          <p:cNvPr id="6" name="图片 5"/>
           <p:cNvPicPr>
             <a:picLocks noChangeAspect="1"/>
           </p:cNvPicPr>
@@ -7028,168 +7882,6 @@
         </p:spPr>
       </p:pic>
     </p:spTree>
-    <p:extLst>
-      <p:ext uri="{BB962C8B-B14F-4D97-AF65-F5344CB8AC3E}">
-        <p14:creationId xmlns:p14="http://schemas.microsoft.com/office/powerpoint/2010/main" val="3321760871"/>
-      </p:ext>
-    </p:extLst>
-  </p:cSld>
-  <p:clrMapOvr>
-    <a:masterClrMapping/>
-  </p:clrMapOvr>
-</p:sld>
-</file>
-
-<file path=ppt/slides/slide16.xml><?xml version="1.0" encoding="utf-8"?>
-<p:sld xmlns:a="http://schemas.openxmlformats.org/drawingml/2006/main" xmlns:r="http://schemas.openxmlformats.org/officeDocument/2006/relationships" xmlns:p="http://schemas.openxmlformats.org/presentationml/2006/main">
-  <p:cSld>
-    <p:spTree>
-      <p:nvGrpSpPr>
-        <p:cNvPr id="1" name=""/>
-        <p:cNvGrpSpPr/>
-        <p:nvPr/>
-      </p:nvGrpSpPr>
-      <p:grpSpPr>
-        <a:xfrm>
-          <a:off x="0" y="0"/>
-          <a:ext cx="0" cy="0"/>
-          <a:chOff x="0" y="0"/>
-          <a:chExt cx="0" cy="0"/>
-        </a:xfrm>
-      </p:grpSpPr>
-      <p:sp>
-        <p:nvSpPr>
-          <p:cNvPr id="2" name="标题 1">
-            <a:extLst>
-              <a:ext uri="{FF2B5EF4-FFF2-40B4-BE49-F238E27FC236}">
-                <a16:creationId xmlns:a16="http://schemas.microsoft.com/office/drawing/2014/main" id="{68D0B2BC-F855-48D9-87A1-107873E40790}"/>
-              </a:ext>
-            </a:extLst>
-          </p:cNvPr>
-          <p:cNvSpPr>
-            <a:spLocks noGrp="1"/>
-          </p:cNvSpPr>
-          <p:nvPr>
-            <p:ph type="title"/>
-          </p:nvPr>
-        </p:nvSpPr>
-        <p:spPr/>
-        <p:txBody>
-          <a:bodyPr/>
-          <a:lstStyle/>
-          <a:p>
-            <a:r>
-              <a:rPr lang="en-US" altLang="zh-CN" dirty="0"/>
-              <a:t>Timeline</a:t>
-            </a:r>
-            <a:endParaRPr lang="zh-CN" altLang="en-US" dirty="0"/>
-          </a:p>
-        </p:txBody>
-      </p:sp>
-      <p:sp>
-        <p:nvSpPr>
-          <p:cNvPr id="5" name="内容占位符 4">
-            <a:extLst>
-              <a:ext uri="{FF2B5EF4-FFF2-40B4-BE49-F238E27FC236}">
-                <a16:creationId xmlns:a16="http://schemas.microsoft.com/office/drawing/2014/main" id="{436C54F2-D6B0-46CB-B2D8-6E4D91CF16C9}"/>
-              </a:ext>
-            </a:extLst>
-          </p:cNvPr>
-          <p:cNvSpPr>
-            <a:spLocks noGrp="1"/>
-          </p:cNvSpPr>
-          <p:nvPr>
-            <p:ph idx="1"/>
-          </p:nvPr>
-        </p:nvSpPr>
-        <p:spPr/>
-        <p:txBody>
-          <a:bodyPr>
-            <a:normAutofit lnSpcReduction="10000"/>
-          </a:bodyPr>
-          <a:lstStyle/>
-          <a:p>
-            <a:r>
-              <a:rPr lang="en-US" altLang="zh-CN" dirty="0"/>
-              <a:t>Current progress : </a:t>
-            </a:r>
-          </a:p>
-          <a:p>
-            <a:pPr lvl="1"/>
-            <a:r>
-              <a:rPr lang="en-US" altLang="zh-CN" dirty="0"/>
-              <a:t>Frontend : draft</a:t>
-            </a:r>
-          </a:p>
-          <a:p>
-            <a:pPr lvl="1"/>
-            <a:r>
-              <a:rPr lang="en-US" altLang="zh-CN" dirty="0"/>
-              <a:t>Backend : UML, environment(framework Deployment, CAS)</a:t>
-            </a:r>
-          </a:p>
-          <a:p>
-            <a:pPr lvl="1"/>
-            <a:r>
-              <a:rPr lang="en-US" altLang="zh-CN" dirty="0"/>
-              <a:t>Other : git deployment, README, </a:t>
-            </a:r>
-          </a:p>
-          <a:p>
-            <a:endParaRPr lang="en-US" altLang="zh-CN" dirty="0"/>
-          </a:p>
-          <a:p>
-            <a:r>
-              <a:rPr lang="en-US" altLang="zh-CN" dirty="0"/>
-              <a:t>Oct. 10</a:t>
-            </a:r>
-            <a:r>
-              <a:rPr lang="en-US" altLang="zh-CN" baseline="30000" dirty="0"/>
-              <a:t>th</a:t>
-            </a:r>
-            <a:r>
-              <a:rPr lang="en-US" altLang="zh-CN" dirty="0"/>
-              <a:t>, 2019 : Requirements &amp; Designs</a:t>
-            </a:r>
-          </a:p>
-          <a:p>
-            <a:endParaRPr lang="en-US" altLang="zh-CN" dirty="0"/>
-          </a:p>
-          <a:p>
-            <a:r>
-              <a:rPr lang="en-US" altLang="zh-CN" dirty="0"/>
-              <a:t>Before the next presentation : </a:t>
-            </a:r>
-            <a:r>
-              <a:rPr lang="en-US" altLang="zh-CN" dirty="0">
-                <a:solidFill>
-                  <a:schemeClr val="accent6">
-                    <a:lumMod val="60000"/>
-                    <a:lumOff val="40000"/>
-                  </a:schemeClr>
-                </a:solidFill>
-              </a:rPr>
-              <a:t>Fundamental Implementation</a:t>
-            </a:r>
-          </a:p>
-          <a:p>
-            <a:endParaRPr lang="en-US" altLang="zh-CN" dirty="0"/>
-          </a:p>
-          <a:p>
-            <a:r>
-              <a:rPr lang="en-US" altLang="zh-CN" dirty="0"/>
-              <a:t>Before the last presentation : Advanced Implementation &amp; Verification</a:t>
-            </a:r>
-            <a:endParaRPr lang="zh-CN" altLang="en-US" dirty="0"/>
-          </a:p>
-        </p:txBody>
-      </p:sp>
-    </p:spTree>
-    <p:extLst>
-      <p:ext uri="{BB962C8B-B14F-4D97-AF65-F5344CB8AC3E}">
-        <p14:creationId xmlns:p14="http://schemas.microsoft.com/office/powerpoint/2010/main" val="438656786"/>
-      </p:ext>
-    </p:extLst>
   </p:cSld>
   <p:clrMapOvr>
     <a:masterClrMapping/>
@@ -7216,13 +7908,7 @@
       </p:grpSpPr>
       <p:sp>
         <p:nvSpPr>
-          <p:cNvPr id="2" name="标题 1">
-            <a:extLst>
-              <a:ext uri="{FF2B5EF4-FFF2-40B4-BE49-F238E27FC236}">
-                <a16:creationId xmlns:a16="http://schemas.microsoft.com/office/drawing/2014/main" id="{9790E66D-71B5-46D0-8F8C-45AB126DC85A}"/>
-              </a:ext>
-            </a:extLst>
-          </p:cNvPr>
+          <p:cNvPr id="2" name="标题 1"/>
           <p:cNvSpPr>
             <a:spLocks noGrp="1"/>
           </p:cNvSpPr>
@@ -7250,13 +7936,7 @@
       </p:sp>
       <p:sp>
         <p:nvSpPr>
-          <p:cNvPr id="3" name="内容占位符 2">
-            <a:extLst>
-              <a:ext uri="{FF2B5EF4-FFF2-40B4-BE49-F238E27FC236}">
-                <a16:creationId xmlns:a16="http://schemas.microsoft.com/office/drawing/2014/main" id="{DB007212-DDD9-446B-B7FC-29A8A2F31F45}"/>
-              </a:ext>
-            </a:extLst>
-          </p:cNvPr>
+          <p:cNvPr id="3" name="内容占位符 2"/>
           <p:cNvSpPr>
             <a:spLocks noGrp="1"/>
           </p:cNvSpPr>
@@ -7269,16 +7949,188 @@
           <a:bodyPr/>
           <a:lstStyle/>
           <a:p>
+            <a:r>
+              <a:rPr lang="en-US" altLang="zh-CN" dirty="0"/>
+              <a:t>A platform provides high visualized graphic element to make the modification and creation of course schemas easier.</a:t>
+            </a:r>
+          </a:p>
+          <a:p>
+            <a:endParaRPr lang="en-US" altLang="zh-CN" dirty="0"/>
+          </a:p>
+          <a:p>
+            <a:r>
+              <a:rPr lang="en-US" altLang="zh-CN" dirty="0"/>
+              <a:t>A platform</a:t>
+            </a:r>
+            <a:r>
+              <a:rPr lang="zh-CN" altLang="en-US" dirty="0"/>
+              <a:t> </a:t>
+            </a:r>
+            <a:r>
+              <a:rPr lang="en-US" altLang="zh-CN" dirty="0"/>
+              <a:t>provides a general representation method to unify all the course schemas in different departments.</a:t>
+            </a:r>
+          </a:p>
+          <a:p>
+            <a:endParaRPr lang="en-US" altLang="zh-CN" dirty="0"/>
+          </a:p>
+          <a:p>
+            <a:r>
+              <a:rPr lang="en-US" altLang="zh-CN" dirty="0"/>
+              <a:t>A platform make the SUSTech life </a:t>
+            </a:r>
+            <a:r>
+              <a:rPr lang="en-US" altLang="zh-CN"/>
+              <a:t>simple and easy</a:t>
+            </a:r>
+            <a:r>
+              <a:rPr lang="en-US" altLang="zh-CN" dirty="0"/>
+              <a:t>.</a:t>
+            </a:r>
+          </a:p>
+        </p:txBody>
+      </p:sp>
+    </p:spTree>
+  </p:cSld>
+  <p:clrMapOvr>
+    <a:masterClrMapping/>
+  </p:clrMapOvr>
+</p:sld>
+</file>
+
+<file path=ppt/slides/slide20.xml><?xml version="1.0" encoding="utf-8"?>
+<p:sld xmlns:a="http://schemas.openxmlformats.org/drawingml/2006/main" xmlns:r="http://schemas.openxmlformats.org/officeDocument/2006/relationships" xmlns:p="http://schemas.openxmlformats.org/presentationml/2006/main">
+  <p:cSld>
+    <p:spTree>
+      <p:nvGrpSpPr>
+        <p:cNvPr id="1" name=""/>
+        <p:cNvGrpSpPr/>
+        <p:nvPr/>
+      </p:nvGrpSpPr>
+      <p:grpSpPr>
+        <a:xfrm>
+          <a:off x="0" y="0"/>
+          <a:ext cx="0" cy="0"/>
+          <a:chOff x="0" y="0"/>
+          <a:chExt cx="0" cy="0"/>
+        </a:xfrm>
+      </p:grpSpPr>
+      <p:sp>
+        <p:nvSpPr>
+          <p:cNvPr id="2" name="标题 1"/>
+          <p:cNvSpPr>
+            <a:spLocks noGrp="1"/>
+          </p:cNvSpPr>
+          <p:nvPr>
+            <p:ph type="title"/>
+          </p:nvPr>
+        </p:nvSpPr>
+        <p:spPr/>
+        <p:txBody>
+          <a:bodyPr/>
+          <a:lstStyle/>
+          <a:p>
+            <a:r>
+              <a:rPr lang="en-US" altLang="zh-CN" dirty="0"/>
+              <a:t>Timeline</a:t>
+            </a:r>
             <a:endParaRPr lang="zh-CN" altLang="en-US" dirty="0"/>
           </a:p>
         </p:txBody>
       </p:sp>
+      <p:sp>
+        <p:nvSpPr>
+          <p:cNvPr id="5" name="内容占位符 4"/>
+          <p:cNvSpPr>
+            <a:spLocks noGrp="1"/>
+          </p:cNvSpPr>
+          <p:nvPr>
+            <p:ph idx="1"/>
+          </p:nvPr>
+        </p:nvSpPr>
+        <p:spPr/>
+        <p:txBody>
+          <a:bodyPr>
+            <a:normAutofit lnSpcReduction="10000"/>
+          </a:bodyPr>
+          <a:lstStyle/>
+          <a:p>
+            <a:r>
+              <a:rPr lang="en-US" altLang="zh-CN" dirty="0"/>
+              <a:t>Current progress : </a:t>
+            </a:r>
+          </a:p>
+          <a:p>
+            <a:pPr lvl="1"/>
+            <a:r>
+              <a:rPr lang="en-US" altLang="zh-CN" dirty="0"/>
+              <a:t>Frontend : draft</a:t>
+            </a:r>
+          </a:p>
+          <a:p>
+            <a:pPr lvl="1"/>
+            <a:r>
+              <a:rPr lang="en-US" altLang="zh-CN" dirty="0"/>
+              <a:t>Backend : UML, environment(framework Deployment, CAS)</a:t>
+            </a:r>
+          </a:p>
+          <a:p>
+            <a:pPr lvl="1"/>
+            <a:r>
+              <a:rPr lang="en-US" altLang="zh-CN" dirty="0"/>
+              <a:t>Other : git deployment, README, </a:t>
+            </a:r>
+          </a:p>
+          <a:p>
+            <a:endParaRPr lang="en-US" altLang="zh-CN" dirty="0"/>
+          </a:p>
+          <a:p>
+            <a:r>
+              <a:rPr lang="en-US" altLang="zh-CN" dirty="0"/>
+              <a:t>Oct. 10</a:t>
+            </a:r>
+            <a:r>
+              <a:rPr lang="en-US" altLang="zh-CN" baseline="30000" dirty="0"/>
+              <a:t>th</a:t>
+            </a:r>
+            <a:r>
+              <a:rPr lang="en-US" altLang="zh-CN" dirty="0"/>
+              <a:t>, 2019 : Requirements &amp; Designs</a:t>
+            </a:r>
+          </a:p>
+          <a:p>
+            <a:endParaRPr lang="en-US" altLang="zh-CN" dirty="0"/>
+          </a:p>
+          <a:p>
+            <a:r>
+              <a:rPr lang="en-US" altLang="zh-CN" dirty="0"/>
+              <a:t>Before the next presentation : </a:t>
+            </a:r>
+            <a:r>
+              <a:rPr lang="en-US" altLang="zh-CN" dirty="0">
+                <a:solidFill>
+                  <a:schemeClr val="accent6">
+                    <a:lumMod val="60000"/>
+                    <a:lumOff val="40000"/>
+                  </a:schemeClr>
+                </a:solidFill>
+              </a:rPr>
+              <a:t>Fundamental Implementation</a:t>
+            </a:r>
+          </a:p>
+          <a:p>
+            <a:endParaRPr lang="en-US" altLang="zh-CN" dirty="0"/>
+          </a:p>
+          <a:p>
+            <a:r>
+              <a:rPr lang="en-US" altLang="zh-CN" dirty="0"/>
+              <a:t>Before the last presentation : Advanced Implementation &amp; Verification</a:t>
+            </a:r>
+            <a:endParaRPr lang="zh-CN" altLang="en-US" dirty="0"/>
+          </a:p>
+        </p:txBody>
+      </p:sp>
     </p:spTree>
-    <p:extLst>
-      <p:ext uri="{BB962C8B-B14F-4D97-AF65-F5344CB8AC3E}">
-        <p14:creationId xmlns:p14="http://schemas.microsoft.com/office/powerpoint/2010/main" val="3946143097"/>
-      </p:ext>
-    </p:extLst>
   </p:cSld>
   <p:clrMapOvr>
     <a:masterClrMapping/>
@@ -7305,13 +8157,7 @@
       </p:grpSpPr>
       <p:sp>
         <p:nvSpPr>
-          <p:cNvPr id="2" name="标题 1">
-            <a:extLst>
-              <a:ext uri="{FF2B5EF4-FFF2-40B4-BE49-F238E27FC236}">
-                <a16:creationId xmlns:a16="http://schemas.microsoft.com/office/drawing/2014/main" id="{F15C3B5C-E356-485E-856A-27290F1610BC}"/>
-              </a:ext>
-            </a:extLst>
-          </p:cNvPr>
+          <p:cNvPr id="2" name="标题 1"/>
           <p:cNvSpPr>
             <a:spLocks noGrp="1"/>
           </p:cNvSpPr>
@@ -7334,13 +8180,7 @@
       </p:sp>
       <p:sp>
         <p:nvSpPr>
-          <p:cNvPr id="3" name="内容占位符 2">
-            <a:extLst>
-              <a:ext uri="{FF2B5EF4-FFF2-40B4-BE49-F238E27FC236}">
-                <a16:creationId xmlns:a16="http://schemas.microsoft.com/office/drawing/2014/main" id="{261978A9-78E5-4E8C-93AB-F2127E61DAB6}"/>
-              </a:ext>
-            </a:extLst>
-          </p:cNvPr>
+          <p:cNvPr id="3" name="内容占位符 2"/>
           <p:cNvSpPr>
             <a:spLocks noGrp="1"/>
           </p:cNvSpPr>
@@ -7421,11 +8261,6 @@
         </p:txBody>
       </p:sp>
     </p:spTree>
-    <p:extLst>
-      <p:ext uri="{BB962C8B-B14F-4D97-AF65-F5344CB8AC3E}">
-        <p14:creationId xmlns:p14="http://schemas.microsoft.com/office/powerpoint/2010/main" val="507995021"/>
-      </p:ext>
-    </p:extLst>
   </p:cSld>
   <p:clrMapOvr>
     <a:masterClrMapping/>
@@ -7452,13 +8287,7 @@
       </p:grpSpPr>
       <p:sp>
         <p:nvSpPr>
-          <p:cNvPr id="2" name="标题 1">
-            <a:extLst>
-              <a:ext uri="{FF2B5EF4-FFF2-40B4-BE49-F238E27FC236}">
-                <a16:creationId xmlns:a16="http://schemas.microsoft.com/office/drawing/2014/main" id="{F15C3B5C-E356-485E-856A-27290F1610BC}"/>
-              </a:ext>
-            </a:extLst>
-          </p:cNvPr>
+          <p:cNvPr id="2" name="标题 1"/>
           <p:cNvSpPr>
             <a:spLocks noGrp="1"/>
           </p:cNvSpPr>
@@ -7472,49 +8301,39 @@
           <a:lstStyle/>
           <a:p>
             <a:r>
-              <a:rPr lang="en-US" altLang="zh-CN" dirty="0"/>
-              <a:t>Feature Description - Frontend</a:t>
-            </a:r>
-            <a:endParaRPr lang="zh-CN" altLang="en-US" dirty="0"/>
-          </a:p>
-        </p:txBody>
-      </p:sp>
-      <p:sp>
-        <p:nvSpPr>
-          <p:cNvPr id="3" name="内容占位符 2">
-            <a:extLst>
-              <a:ext uri="{FF2B5EF4-FFF2-40B4-BE49-F238E27FC236}">
-                <a16:creationId xmlns:a16="http://schemas.microsoft.com/office/drawing/2014/main" id="{261978A9-78E5-4E8C-93AB-F2127E61DAB6}"/>
-              </a:ext>
-            </a:extLst>
-          </p:cNvPr>
-          <p:cNvSpPr>
-            <a:spLocks noGrp="1"/>
-          </p:cNvSpPr>
+              <a:rPr lang="en-US" altLang="zh-CN"/>
+              <a:t>Students - check all curriculum</a:t>
+            </a:r>
+          </a:p>
+        </p:txBody>
+      </p:sp>
+      <p:pic>
+        <p:nvPicPr>
+          <p:cNvPr id="5" name="内容占位符 4"/>
+          <p:cNvPicPr>
+            <a:picLocks noGrp="1" noChangeAspect="1"/>
+          </p:cNvPicPr>
           <p:nvPr>
             <p:ph idx="1"/>
           </p:nvPr>
-        </p:nvSpPr>
+        </p:nvPicPr>
+        <p:blipFill>
+          <a:blip r:embed="rId2"/>
+          <a:stretch>
+            <a:fillRect/>
+          </a:stretch>
+        </p:blipFill>
         <p:spPr>
           <a:xfrm>
-            <a:off x="677334" y="2160589"/>
-            <a:ext cx="8596668" cy="3880773"/>
+            <a:off x="1383665" y="2160905"/>
+            <a:ext cx="7183755" cy="3880485"/>
           </a:xfrm>
+          <a:prstGeom prst="rect">
+            <a:avLst/>
+          </a:prstGeom>
         </p:spPr>
-        <p:txBody>
-          <a:bodyPr/>
-          <a:lstStyle/>
-          <a:p>
-            <a:endParaRPr lang="en-US" altLang="zh-CN" dirty="0"/>
-          </a:p>
-        </p:txBody>
-      </p:sp>
+      </p:pic>
     </p:spTree>
-    <p:extLst>
-      <p:ext uri="{BB962C8B-B14F-4D97-AF65-F5344CB8AC3E}">
-        <p14:creationId xmlns:p14="http://schemas.microsoft.com/office/powerpoint/2010/main" val="3052875471"/>
-      </p:ext>
-    </p:extLst>
   </p:cSld>
   <p:clrMapOvr>
     <a:masterClrMapping/>
@@ -7541,13 +8360,7 @@
       </p:grpSpPr>
       <p:sp>
         <p:nvSpPr>
-          <p:cNvPr id="2" name="标题 1">
-            <a:extLst>
-              <a:ext uri="{FF2B5EF4-FFF2-40B4-BE49-F238E27FC236}">
-                <a16:creationId xmlns:a16="http://schemas.microsoft.com/office/drawing/2014/main" id="{F15C3B5C-E356-485E-856A-27290F1610BC}"/>
-              </a:ext>
-            </a:extLst>
-          </p:cNvPr>
+          <p:cNvPr id="2" name="标题 1"/>
           <p:cNvSpPr>
             <a:spLocks noGrp="1"/>
           </p:cNvSpPr>
@@ -7562,98 +8375,43 @@
           <a:p>
             <a:r>
               <a:rPr lang="en-US" altLang="zh-CN" dirty="0"/>
-              <a:t>Feature Description – User Group</a:t>
-            </a:r>
-            <a:endParaRPr lang="zh-CN" altLang="en-US" dirty="0"/>
-          </a:p>
-        </p:txBody>
-      </p:sp>
-      <p:sp>
-        <p:nvSpPr>
-          <p:cNvPr id="3" name="内容占位符 2">
-            <a:extLst>
-              <a:ext uri="{FF2B5EF4-FFF2-40B4-BE49-F238E27FC236}">
-                <a16:creationId xmlns:a16="http://schemas.microsoft.com/office/drawing/2014/main" id="{261978A9-78E5-4E8C-93AB-F2127E61DAB6}"/>
-              </a:ext>
-            </a:extLst>
-          </p:cNvPr>
-          <p:cNvSpPr>
-            <a:spLocks noGrp="1"/>
-          </p:cNvSpPr>
+              <a:t>Students - my </a:t>
+            </a:r>
+            <a:r>
+              <a:rPr lang="en-US" altLang="zh-CN"/>
+              <a:t>course schema</a:t>
+            </a:r>
+            <a:endParaRPr lang="en-US" altLang="zh-CN" dirty="0"/>
+          </a:p>
+        </p:txBody>
+      </p:sp>
+      <p:pic>
+        <p:nvPicPr>
+          <p:cNvPr id="8" name="内容占位符 7"/>
+          <p:cNvPicPr>
+            <a:picLocks noGrp="1" noChangeAspect="1"/>
+          </p:cNvPicPr>
           <p:nvPr>
             <p:ph idx="1"/>
           </p:nvPr>
-        </p:nvSpPr>
+        </p:nvPicPr>
+        <p:blipFill>
+          <a:blip r:embed="rId3"/>
+          <a:stretch>
+            <a:fillRect/>
+          </a:stretch>
+        </p:blipFill>
         <p:spPr>
           <a:xfrm>
-            <a:off x="677334" y="2160589"/>
-            <a:ext cx="8596668" cy="3880773"/>
+            <a:off x="1334770" y="2160905"/>
+            <a:ext cx="7281545" cy="3880485"/>
           </a:xfrm>
+          <a:prstGeom prst="rect">
+            <a:avLst/>
+          </a:prstGeom>
         </p:spPr>
-        <p:txBody>
-          <a:bodyPr/>
-          <a:lstStyle/>
-          <a:p>
-            <a:r>
-              <a:rPr lang="en-US" altLang="zh-CN" dirty="0"/>
-              <a:t>Staff Group</a:t>
-            </a:r>
-          </a:p>
-          <a:p>
-            <a:pPr lvl="1"/>
-            <a:r>
-              <a:rPr lang="en-US" altLang="zh-CN" dirty="0"/>
-              <a:t>General</a:t>
-            </a:r>
-          </a:p>
-          <a:p>
-            <a:pPr lvl="1"/>
-            <a:r>
-              <a:rPr lang="en-US" altLang="zh-CN" dirty="0"/>
-              <a:t>Secretary</a:t>
-            </a:r>
-          </a:p>
-          <a:p>
-            <a:pPr lvl="1"/>
-            <a:r>
-              <a:rPr lang="en-US" altLang="zh-CN" dirty="0"/>
-              <a:t>Teaching Affairs Department</a:t>
-            </a:r>
-          </a:p>
-          <a:p>
-            <a:pPr lvl="1"/>
-            <a:r>
-              <a:rPr lang="en-US" altLang="zh-CN" dirty="0"/>
-              <a:t>Mentor &amp; College Instructor</a:t>
-            </a:r>
-          </a:p>
-          <a:p>
-            <a:r>
-              <a:rPr lang="en-US" altLang="zh-CN" dirty="0"/>
-              <a:t>Student Group</a:t>
-            </a:r>
-          </a:p>
-          <a:p>
-            <a:pPr lvl="1"/>
-            <a:r>
-              <a:rPr lang="en-US" altLang="zh-CN" dirty="0"/>
-              <a:t>General</a:t>
-            </a:r>
-          </a:p>
-          <a:p>
-            <a:r>
-              <a:rPr lang="en-US" altLang="zh-CN" dirty="0"/>
-              <a:t>Visitor</a:t>
-            </a:r>
-          </a:p>
-        </p:txBody>
-      </p:sp>
+      </p:pic>
     </p:spTree>
-    <p:extLst>
-      <p:ext uri="{BB962C8B-B14F-4D97-AF65-F5344CB8AC3E}">
-        <p14:creationId xmlns:p14="http://schemas.microsoft.com/office/powerpoint/2010/main" val="1567179739"/>
-      </p:ext>
-    </p:extLst>
   </p:cSld>
   <p:clrMapOvr>
     <a:masterClrMapping/>
@@ -7680,13 +8438,7 @@
       </p:grpSpPr>
       <p:sp>
         <p:nvSpPr>
-          <p:cNvPr id="2" name="标题 1">
-            <a:extLst>
-              <a:ext uri="{FF2B5EF4-FFF2-40B4-BE49-F238E27FC236}">
-                <a16:creationId xmlns:a16="http://schemas.microsoft.com/office/drawing/2014/main" id="{F15C3B5C-E356-485E-856A-27290F1610BC}"/>
-              </a:ext>
-            </a:extLst>
-          </p:cNvPr>
+          <p:cNvPr id="2" name="标题 1"/>
           <p:cNvSpPr>
             <a:spLocks noGrp="1"/>
           </p:cNvSpPr>
@@ -7700,107 +8452,39 @@
           <a:lstStyle/>
           <a:p>
             <a:r>
-              <a:rPr lang="en-US" altLang="zh-CN" dirty="0"/>
-              <a:t>Feature Description – Staff Group</a:t>
-            </a:r>
-            <a:endParaRPr lang="zh-CN" altLang="en-US" dirty="0"/>
-          </a:p>
-        </p:txBody>
-      </p:sp>
-      <p:sp>
-        <p:nvSpPr>
-          <p:cNvPr id="3" name="内容占位符 2">
-            <a:extLst>
-              <a:ext uri="{FF2B5EF4-FFF2-40B4-BE49-F238E27FC236}">
-                <a16:creationId xmlns:a16="http://schemas.microsoft.com/office/drawing/2014/main" id="{261978A9-78E5-4E8C-93AB-F2127E61DAB6}"/>
-              </a:ext>
-            </a:extLst>
-          </p:cNvPr>
-          <p:cNvSpPr>
-            <a:spLocks noGrp="1"/>
-          </p:cNvSpPr>
+              <a:rPr lang="en-US" altLang="zh-CN"/>
+              <a:t>Students - my plan</a:t>
+            </a:r>
+          </a:p>
+        </p:txBody>
+      </p:sp>
+      <p:pic>
+        <p:nvPicPr>
+          <p:cNvPr id="4" name="内容占位符 3"/>
+          <p:cNvPicPr>
+            <a:picLocks noGrp="1" noChangeAspect="1"/>
+          </p:cNvPicPr>
           <p:nvPr>
             <p:ph idx="1"/>
           </p:nvPr>
-        </p:nvSpPr>
+        </p:nvPicPr>
+        <p:blipFill>
+          <a:blip r:embed="rId3"/>
+          <a:stretch>
+            <a:fillRect/>
+          </a:stretch>
+        </p:blipFill>
         <p:spPr>
           <a:xfrm>
-            <a:off x="677334" y="2160589"/>
-            <a:ext cx="8596668" cy="3880773"/>
+            <a:off x="1383665" y="2160905"/>
+            <a:ext cx="7183755" cy="3880485"/>
           </a:xfrm>
+          <a:prstGeom prst="rect">
+            <a:avLst/>
+          </a:prstGeom>
         </p:spPr>
-        <p:txBody>
-          <a:bodyPr/>
-          <a:lstStyle/>
-          <a:p>
-            <a:r>
-              <a:rPr lang="en-US" altLang="zh-CN" dirty="0"/>
-              <a:t>General</a:t>
-            </a:r>
-          </a:p>
-          <a:p>
-            <a:pPr lvl="1"/>
-            <a:r>
-              <a:rPr lang="en-US" altLang="zh-CN" dirty="0"/>
-              <a:t>Check all the course schemas</a:t>
-            </a:r>
-          </a:p>
-          <a:p>
-            <a:pPr lvl="1"/>
-            <a:r>
-              <a:rPr lang="en-US" altLang="zh-CN" dirty="0"/>
-              <a:t>Check his/her visible students’ information</a:t>
-            </a:r>
-          </a:p>
-          <a:p>
-            <a:r>
-              <a:rPr lang="en-US" altLang="zh-CN" dirty="0"/>
-              <a:t>Secretary</a:t>
-            </a:r>
-          </a:p>
-          <a:p>
-            <a:pPr lvl="1"/>
-            <a:r>
-              <a:rPr lang="en-US" altLang="zh-CN" dirty="0"/>
-              <a:t>Upload course schemas (Request)</a:t>
-            </a:r>
-          </a:p>
-          <a:p>
-            <a:pPr lvl="1"/>
-            <a:r>
-              <a:rPr lang="en-US" altLang="zh-CN" dirty="0"/>
-              <a:t>Edit course schemas online (Request)</a:t>
-            </a:r>
-          </a:p>
-          <a:p>
-            <a:pPr lvl="1"/>
-            <a:r>
-              <a:rPr lang="en-US" altLang="zh-CN" dirty="0"/>
-              <a:t>Delete course schemas (Request)</a:t>
-            </a:r>
-          </a:p>
-          <a:p>
-            <a:pPr lvl="1"/>
-            <a:r>
-              <a:rPr lang="en-US" altLang="zh-CN" dirty="0"/>
-              <a:t>Contact Administrators</a:t>
-            </a:r>
-          </a:p>
-          <a:p>
-            <a:pPr lvl="1"/>
-            <a:r>
-              <a:rPr lang="en-US" altLang="zh-CN" dirty="0"/>
-              <a:t>Assign course schemas to students (Request)</a:t>
-            </a:r>
-          </a:p>
-        </p:txBody>
-      </p:sp>
+      </p:pic>
     </p:spTree>
-    <p:extLst>
-      <p:ext uri="{BB962C8B-B14F-4D97-AF65-F5344CB8AC3E}">
-        <p14:creationId xmlns:p14="http://schemas.microsoft.com/office/powerpoint/2010/main" val="175647389"/>
-      </p:ext>
-    </p:extLst>
   </p:cSld>
   <p:clrMapOvr>
     <a:masterClrMapping/>
@@ -7827,13 +8511,7 @@
       </p:grpSpPr>
       <p:sp>
         <p:nvSpPr>
-          <p:cNvPr id="2" name="标题 1">
-            <a:extLst>
-              <a:ext uri="{FF2B5EF4-FFF2-40B4-BE49-F238E27FC236}">
-                <a16:creationId xmlns:a16="http://schemas.microsoft.com/office/drawing/2014/main" id="{F15C3B5C-E356-485E-856A-27290F1610BC}"/>
-              </a:ext>
-            </a:extLst>
-          </p:cNvPr>
+          <p:cNvPr id="2" name="标题 1"/>
           <p:cNvSpPr>
             <a:spLocks noGrp="1"/>
           </p:cNvSpPr>
@@ -7847,94 +8525,39 @@
           <a:lstStyle/>
           <a:p>
             <a:r>
-              <a:rPr lang="en-US" altLang="zh-CN" dirty="0"/>
-              <a:t>Feature Description – Staff Group</a:t>
-            </a:r>
-            <a:endParaRPr lang="zh-CN" altLang="en-US" dirty="0"/>
-          </a:p>
-        </p:txBody>
-      </p:sp>
-      <p:sp>
-        <p:nvSpPr>
-          <p:cNvPr id="3" name="内容占位符 2">
-            <a:extLst>
-              <a:ext uri="{FF2B5EF4-FFF2-40B4-BE49-F238E27FC236}">
-                <a16:creationId xmlns:a16="http://schemas.microsoft.com/office/drawing/2014/main" id="{261978A9-78E5-4E8C-93AB-F2127E61DAB6}"/>
-              </a:ext>
-            </a:extLst>
-          </p:cNvPr>
-          <p:cNvSpPr>
-            <a:spLocks noGrp="1"/>
-          </p:cNvSpPr>
+              <a:rPr lang="en-US" altLang="zh-CN"/>
+              <a:t>Department scretary - upload</a:t>
+            </a:r>
+          </a:p>
+        </p:txBody>
+      </p:sp>
+      <p:pic>
+        <p:nvPicPr>
+          <p:cNvPr id="5" name="内容占位符 4"/>
+          <p:cNvPicPr>
+            <a:picLocks noGrp="1" noChangeAspect="1"/>
+          </p:cNvPicPr>
           <p:nvPr>
             <p:ph idx="1"/>
           </p:nvPr>
-        </p:nvSpPr>
+        </p:nvPicPr>
+        <p:blipFill>
+          <a:blip r:embed="rId3"/>
+          <a:stretch>
+            <a:fillRect/>
+          </a:stretch>
+        </p:blipFill>
         <p:spPr>
           <a:xfrm>
-            <a:off x="677334" y="2160589"/>
-            <a:ext cx="8596668" cy="3880773"/>
+            <a:off x="1527810" y="2160905"/>
+            <a:ext cx="6894830" cy="3880485"/>
           </a:xfrm>
+          <a:prstGeom prst="rect">
+            <a:avLst/>
+          </a:prstGeom>
         </p:spPr>
-        <p:txBody>
-          <a:bodyPr/>
-          <a:lstStyle/>
-          <a:p>
-            <a:r>
-              <a:rPr lang="en-US" altLang="zh-CN" dirty="0"/>
-              <a:t>Teaching Affairs Department</a:t>
-            </a:r>
-          </a:p>
-          <a:p>
-            <a:pPr lvl="1"/>
-            <a:r>
-              <a:rPr lang="en-US" altLang="zh-CN" dirty="0"/>
-              <a:t>Create New Courses</a:t>
-            </a:r>
-          </a:p>
-          <a:p>
-            <a:pPr lvl="1"/>
-            <a:r>
-              <a:rPr lang="en-US" altLang="zh-CN" dirty="0"/>
-              <a:t>Synchronize course information</a:t>
-            </a:r>
-          </a:p>
-          <a:p>
-            <a:pPr lvl="1"/>
-            <a:r>
-              <a:rPr lang="en-US" altLang="zh-CN" dirty="0"/>
-              <a:t>Audit course schemas deletion</a:t>
-            </a:r>
-          </a:p>
-          <a:p>
-            <a:pPr lvl="1"/>
-            <a:r>
-              <a:rPr lang="en-US" altLang="zh-CN" dirty="0"/>
-              <a:t>Audit new course schemas</a:t>
-            </a:r>
-          </a:p>
-          <a:p>
-            <a:pPr lvl="1"/>
-            <a:r>
-              <a:rPr lang="en-US" altLang="zh-CN" dirty="0"/>
-              <a:t>Audit course schemas modifications</a:t>
-            </a:r>
-          </a:p>
-          <a:p>
-            <a:pPr lvl="1"/>
-            <a:r>
-              <a:rPr lang="en-US" altLang="zh-CN" dirty="0"/>
-              <a:t>Audit course schemas assignments</a:t>
-            </a:r>
-          </a:p>
-        </p:txBody>
-      </p:sp>
+      </p:pic>
     </p:spTree>
-    <p:extLst>
-      <p:ext uri="{BB962C8B-B14F-4D97-AF65-F5344CB8AC3E}">
-        <p14:creationId xmlns:p14="http://schemas.microsoft.com/office/powerpoint/2010/main" val="2725686459"/>
-      </p:ext>
-    </p:extLst>
   </p:cSld>
   <p:clrMapOvr>
     <a:masterClrMapping/>
@@ -7961,13 +8584,7 @@
       </p:grpSpPr>
       <p:sp>
         <p:nvSpPr>
-          <p:cNvPr id="2" name="标题 1">
-            <a:extLst>
-              <a:ext uri="{FF2B5EF4-FFF2-40B4-BE49-F238E27FC236}">
-                <a16:creationId xmlns:a16="http://schemas.microsoft.com/office/drawing/2014/main" id="{F15C3B5C-E356-485E-856A-27290F1610BC}"/>
-              </a:ext>
-            </a:extLst>
-          </p:cNvPr>
+          <p:cNvPr id="2" name="标题 1"/>
           <p:cNvSpPr>
             <a:spLocks noGrp="1"/>
           </p:cNvSpPr>
@@ -7981,87 +8598,39 @@
           <a:lstStyle/>
           <a:p>
             <a:r>
-              <a:rPr lang="en-US" altLang="zh-CN" dirty="0"/>
-              <a:t>Feature Description – Student Group</a:t>
-            </a:r>
-            <a:endParaRPr lang="zh-CN" altLang="en-US" dirty="0"/>
-          </a:p>
-        </p:txBody>
-      </p:sp>
-      <p:sp>
-        <p:nvSpPr>
-          <p:cNvPr id="3" name="内容占位符 2">
-            <a:extLst>
-              <a:ext uri="{FF2B5EF4-FFF2-40B4-BE49-F238E27FC236}">
-                <a16:creationId xmlns:a16="http://schemas.microsoft.com/office/drawing/2014/main" id="{261978A9-78E5-4E8C-93AB-F2127E61DAB6}"/>
-              </a:ext>
-            </a:extLst>
-          </p:cNvPr>
-          <p:cNvSpPr>
-            <a:spLocks noGrp="1"/>
-          </p:cNvSpPr>
+              <a:rPr lang="en-US" altLang="zh-CN"/>
+              <a:t>Department scretary - comparation</a:t>
+            </a:r>
+          </a:p>
+        </p:txBody>
+      </p:sp>
+      <p:pic>
+        <p:nvPicPr>
+          <p:cNvPr id="7" name="内容占位符 6"/>
+          <p:cNvPicPr>
+            <a:picLocks noGrp="1" noChangeAspect="1"/>
+          </p:cNvPicPr>
           <p:nvPr>
             <p:ph idx="1"/>
           </p:nvPr>
-        </p:nvSpPr>
+        </p:nvPicPr>
+        <p:blipFill>
+          <a:blip r:embed="rId3"/>
+          <a:stretch>
+            <a:fillRect/>
+          </a:stretch>
+        </p:blipFill>
         <p:spPr>
           <a:xfrm>
-            <a:off x="677334" y="2160589"/>
-            <a:ext cx="8596668" cy="3880773"/>
+            <a:off x="1522730" y="2160905"/>
+            <a:ext cx="6905625" cy="3880485"/>
           </a:xfrm>
+          <a:prstGeom prst="rect">
+            <a:avLst/>
+          </a:prstGeom>
         </p:spPr>
-        <p:txBody>
-          <a:bodyPr/>
-          <a:lstStyle/>
-          <a:p>
-            <a:r>
-              <a:rPr lang="en-US" altLang="zh-CN" dirty="0"/>
-              <a:t>General</a:t>
-            </a:r>
-          </a:p>
-          <a:p>
-            <a:pPr lvl="1"/>
-            <a:r>
-              <a:rPr lang="en-US" altLang="zh-CN" dirty="0"/>
-              <a:t>Check all course schemas</a:t>
-            </a:r>
-          </a:p>
-          <a:p>
-            <a:pPr lvl="1"/>
-            <a:r>
-              <a:rPr lang="en-US" altLang="zh-CN" dirty="0"/>
-              <a:t>Check his/her own course schema</a:t>
-            </a:r>
-          </a:p>
-          <a:p>
-            <a:pPr lvl="1"/>
-            <a:r>
-              <a:rPr lang="en-US" altLang="zh-CN" dirty="0"/>
-              <a:t>Check “My Plan”</a:t>
-            </a:r>
-          </a:p>
-          <a:p>
-            <a:pPr lvl="1"/>
-            <a:r>
-              <a:rPr lang="en-US" altLang="zh-CN" dirty="0"/>
-              <a:t>Edit “My Plan”</a:t>
-            </a:r>
-          </a:p>
-          <a:p>
-            <a:pPr lvl="1"/>
-            <a:r>
-              <a:rPr lang="en-US" altLang="zh-CN" dirty="0"/>
-              <a:t>Collect course </a:t>
-            </a:r>
-          </a:p>
-        </p:txBody>
-      </p:sp>
+      </p:pic>
     </p:spTree>
-    <p:extLst>
-      <p:ext uri="{BB962C8B-B14F-4D97-AF65-F5344CB8AC3E}">
-        <p14:creationId xmlns:p14="http://schemas.microsoft.com/office/powerpoint/2010/main" val="3764670779"/>
-      </p:ext>
-    </p:extLst>
   </p:cSld>
   <p:clrMapOvr>
     <a:masterClrMapping/>
@@ -8088,13 +8657,7 @@
       </p:grpSpPr>
       <p:sp>
         <p:nvSpPr>
-          <p:cNvPr id="2" name="标题 1">
-            <a:extLst>
-              <a:ext uri="{FF2B5EF4-FFF2-40B4-BE49-F238E27FC236}">
-                <a16:creationId xmlns:a16="http://schemas.microsoft.com/office/drawing/2014/main" id="{DD1FCACC-76DC-4AA0-8059-A13D31EB3418}"/>
-              </a:ext>
-            </a:extLst>
-          </p:cNvPr>
+          <p:cNvPr id="2" name="标题 1"/>
           <p:cNvSpPr>
             <a:spLocks noGrp="1"/>
           </p:cNvSpPr>
@@ -8109,7 +8672,7 @@
           <a:p>
             <a:r>
               <a:rPr lang="en-US" altLang="zh-CN" dirty="0"/>
-              <a:t>Techniques</a:t>
+              <a:t>Feature Description – User Group</a:t>
             </a:r>
             <a:endParaRPr lang="zh-CN" altLang="en-US" dirty="0"/>
           </a:p>
@@ -8117,13 +8680,7 @@
       </p:sp>
       <p:sp>
         <p:nvSpPr>
-          <p:cNvPr id="3" name="内容占位符 2">
-            <a:extLst>
-              <a:ext uri="{FF2B5EF4-FFF2-40B4-BE49-F238E27FC236}">
-                <a16:creationId xmlns:a16="http://schemas.microsoft.com/office/drawing/2014/main" id="{D858CA24-E962-4B24-8BE9-E72DE30FD89E}"/>
-              </a:ext>
-            </a:extLst>
-          </p:cNvPr>
+          <p:cNvPr id="3" name="内容占位符 2"/>
           <p:cNvSpPr>
             <a:spLocks noGrp="1"/>
           </p:cNvSpPr>
@@ -8133,7 +8690,7 @@
         </p:nvSpPr>
         <p:spPr>
           <a:xfrm>
-            <a:off x="677334" y="1488613"/>
+            <a:off x="677334" y="2160589"/>
             <a:ext cx="8596668" cy="3880773"/>
           </a:xfrm>
         </p:spPr>
@@ -8143,146 +8700,59 @@
           <a:p>
             <a:r>
               <a:rPr lang="en-US" altLang="zh-CN" dirty="0"/>
-              <a:t>Teamwork Communication</a:t>
-            </a:r>
-          </a:p>
-          <a:p>
-            <a:endParaRPr lang="en-US" altLang="zh-CN" dirty="0"/>
-          </a:p>
-          <a:p>
+              <a:t>Staff Group</a:t>
+            </a:r>
+          </a:p>
+          <a:p>
+            <a:pPr lvl="1"/>
             <a:r>
               <a:rPr lang="en-US" altLang="zh-CN" dirty="0"/>
-              <a:t>UML Development</a:t>
-            </a:r>
-          </a:p>
-          <a:p>
-            <a:endParaRPr lang="en-US" altLang="zh-CN" dirty="0"/>
-          </a:p>
-          <a:p>
+              <a:t>General</a:t>
+            </a:r>
+          </a:p>
+          <a:p>
+            <a:pPr lvl="1"/>
             <a:r>
               <a:rPr lang="en-US" altLang="zh-CN" dirty="0"/>
-              <a:t>Code Management</a:t>
-            </a:r>
-          </a:p>
-          <a:p>
-            <a:pPr marL="0" indent="0">
-              <a:buNone/>
-            </a:pPr>
+              <a:t>Secretary</a:t>
+            </a:r>
+          </a:p>
+          <a:p>
+            <a:pPr lvl="1"/>
             <a:r>
               <a:rPr lang="en-US" altLang="zh-CN" dirty="0"/>
-              <a:t> </a:t>
-            </a:r>
-          </a:p>
-          <a:p>
-            <a:endParaRPr lang="en-US" altLang="zh-CN" dirty="0"/>
-          </a:p>
-          <a:p>
-            <a:endParaRPr lang="en-US" altLang="zh-CN" dirty="0"/>
-          </a:p>
-          <a:p>
-            <a:pPr marL="0" indent="0">
-              <a:buNone/>
-            </a:pPr>
-            <a:endParaRPr lang="zh-CN" altLang="en-US" dirty="0"/>
-          </a:p>
-        </p:txBody>
-      </p:sp>
-      <p:pic>
-        <p:nvPicPr>
-          <p:cNvPr id="8" name="图片 7">
-            <a:extLst>
-              <a:ext uri="{FF2B5EF4-FFF2-40B4-BE49-F238E27FC236}">
-                <a16:creationId xmlns:a16="http://schemas.microsoft.com/office/drawing/2014/main" id="{F2AA20D1-2465-407B-BF28-F480A4AA5824}"/>
-              </a:ext>
-            </a:extLst>
-          </p:cNvPr>
-          <p:cNvPicPr>
-            <a:picLocks noChangeAspect="1"/>
-          </p:cNvPicPr>
-          <p:nvPr/>
-        </p:nvPicPr>
-        <p:blipFill>
-          <a:blip r:embed="rId2"/>
-          <a:stretch>
-            <a:fillRect/>
-          </a:stretch>
-        </p:blipFill>
-        <p:spPr>
-          <a:xfrm>
-            <a:off x="3925912" y="1449394"/>
-            <a:ext cx="1202270" cy="520293"/>
-          </a:xfrm>
-          <a:prstGeom prst="rect">
-            <a:avLst/>
-          </a:prstGeom>
-        </p:spPr>
-      </p:pic>
-      <p:pic>
-        <p:nvPicPr>
-          <p:cNvPr id="9" name="图片 8">
-            <a:extLst>
-              <a:ext uri="{FF2B5EF4-FFF2-40B4-BE49-F238E27FC236}">
-                <a16:creationId xmlns:a16="http://schemas.microsoft.com/office/drawing/2014/main" id="{EB89CEA1-53E5-4E87-AB05-EF09651B3AC1}"/>
-              </a:ext>
-            </a:extLst>
-          </p:cNvPr>
-          <p:cNvPicPr>
-            <a:picLocks noChangeAspect="1"/>
-          </p:cNvPicPr>
-          <p:nvPr/>
-        </p:nvPicPr>
-        <p:blipFill>
-          <a:blip r:embed="rId3"/>
-          <a:stretch>
-            <a:fillRect/>
-          </a:stretch>
-        </p:blipFill>
-        <p:spPr>
-          <a:xfrm>
-            <a:off x="3123659" y="2215151"/>
-            <a:ext cx="1476375" cy="485775"/>
-          </a:xfrm>
-          <a:prstGeom prst="rect">
-            <a:avLst/>
-          </a:prstGeom>
-        </p:spPr>
-      </p:pic>
-      <p:pic>
-        <p:nvPicPr>
-          <p:cNvPr id="10" name="图片 9">
-            <a:extLst>
-              <a:ext uri="{FF2B5EF4-FFF2-40B4-BE49-F238E27FC236}">
-                <a16:creationId xmlns:a16="http://schemas.microsoft.com/office/drawing/2014/main" id="{194AA9AD-3A71-4C71-87B8-BAE43433FD8B}"/>
-              </a:ext>
-            </a:extLst>
-          </p:cNvPr>
-          <p:cNvPicPr>
-            <a:picLocks noChangeAspect="1"/>
-          </p:cNvPicPr>
-          <p:nvPr/>
-        </p:nvPicPr>
-        <p:blipFill>
-          <a:blip r:embed="rId4"/>
-          <a:stretch>
-            <a:fillRect/>
-          </a:stretch>
-        </p:blipFill>
-        <p:spPr>
-          <a:xfrm>
-            <a:off x="3123659" y="3009943"/>
-            <a:ext cx="1083156" cy="544559"/>
-          </a:xfrm>
-          <a:prstGeom prst="rect">
-            <a:avLst/>
-          </a:prstGeom>
-        </p:spPr>
-      </p:pic>
+              <a:t>Teaching Affairs Department</a:t>
+            </a:r>
+          </a:p>
+          <a:p>
+            <a:pPr lvl="1"/>
+            <a:r>
+              <a:rPr lang="en-US" altLang="zh-CN" dirty="0"/>
+              <a:t>Mentor &amp; College Instructor</a:t>
+            </a:r>
+          </a:p>
+          <a:p>
+            <a:r>
+              <a:rPr lang="en-US" altLang="zh-CN" dirty="0"/>
+              <a:t>Student Group</a:t>
+            </a:r>
+          </a:p>
+          <a:p>
+            <a:pPr lvl="1"/>
+            <a:r>
+              <a:rPr lang="en-US" altLang="zh-CN" dirty="0"/>
+              <a:t>General</a:t>
+            </a:r>
+          </a:p>
+          <a:p>
+            <a:r>
+              <a:rPr lang="en-US" altLang="zh-CN" dirty="0"/>
+              <a:t>Visitor</a:t>
+            </a:r>
+          </a:p>
+        </p:txBody>
+      </p:sp>
     </p:spTree>
-    <p:extLst>
-      <p:ext uri="{BB962C8B-B14F-4D97-AF65-F5344CB8AC3E}">
-        <p14:creationId xmlns:p14="http://schemas.microsoft.com/office/powerpoint/2010/main" val="816724774"/>
-      </p:ext>
-    </p:extLst>
   </p:cSld>
   <p:clrMapOvr>
     <a:masterClrMapping/>
@@ -8333,7 +8803,7 @@
     </a:clrScheme>
     <a:fontScheme name="平面">
       <a:majorFont>
-        <a:latin typeface="Trebuchet MS" panose="020B0603020202020204"/>
+        <a:latin typeface="Trebuchet MS"/>
         <a:ea typeface=""/>
         <a:cs typeface=""/>
         <a:font script="Jpan" typeface="メイリオ"/>
@@ -8368,7 +8838,7 @@
         <a:font script="Geor" typeface="Sylfaen"/>
       </a:majorFont>
       <a:minorFont>
-        <a:latin typeface="Trebuchet MS" panose="020B0603020202020204"/>
+        <a:latin typeface="Trebuchet MS"/>
         <a:ea typeface=""/>
         <a:cs typeface=""/>
         <a:font script="Jpan" typeface="メイリオ"/>
@@ -8541,7 +9011,268 @@
   <a:extraClrSchemeLst/>
   <a:extLst>
     <a:ext uri="{05A4C25C-085E-4340-85A3-A5531E510DB2}">
-      <thm15:themeFamily xmlns:thm15="http://schemas.microsoft.com/office/thememl/2012/main" name="Facet" id="{C0C680CD-088A-49FC-A102-D699147F32B2}" vid="{8C59B386-999D-4CB6-B907-9F3997C027CC}"/>
+      <thm15:themeFamily xmlns:thm15="http://schemas.microsoft.com/office/thememl/2012/main" name="Office Theme" id="{62F939B6-93AF-4DB8-9C6B-D6C7DFDC589F}" vid="{4A3C46E8-61CC-4603-A589-7422A47A8E4A}"/>
+    </a:ext>
+  </a:extLst>
+</a:theme>
+</file>
+
+<file path=ppt/theme/theme2.xml><?xml version="1.0" encoding="utf-8"?>
+<a:theme xmlns:a="http://schemas.openxmlformats.org/drawingml/2006/main" name="Office 主题">
+  <a:themeElements>
+    <a:clrScheme name="Office">
+      <a:dk1>
+        <a:sysClr val="windowText" lastClr="000000"/>
+      </a:dk1>
+      <a:lt1>
+        <a:sysClr val="window" lastClr="FFFFFF"/>
+      </a:lt1>
+      <a:dk2>
+        <a:srgbClr val="44546A"/>
+      </a:dk2>
+      <a:lt2>
+        <a:srgbClr val="E7E6E6"/>
+      </a:lt2>
+      <a:accent1>
+        <a:srgbClr val="5B9BD5"/>
+      </a:accent1>
+      <a:accent2>
+        <a:srgbClr val="ED7D31"/>
+      </a:accent2>
+      <a:accent3>
+        <a:srgbClr val="A5A5A5"/>
+      </a:accent3>
+      <a:accent4>
+        <a:srgbClr val="FFC000"/>
+      </a:accent4>
+      <a:accent5>
+        <a:srgbClr val="4472C4"/>
+      </a:accent5>
+      <a:accent6>
+        <a:srgbClr val="70AD47"/>
+      </a:accent6>
+      <a:hlink>
+        <a:srgbClr val="0563C1"/>
+      </a:hlink>
+      <a:folHlink>
+        <a:srgbClr val="954F72"/>
+      </a:folHlink>
+    </a:clrScheme>
+    <a:fontScheme name="Office">
+      <a:majorFont>
+        <a:latin typeface="Calibri Light"/>
+        <a:ea typeface=""/>
+        <a:cs typeface=""/>
+        <a:font script="Jpan" typeface="ＭＳ Ｐゴシック"/>
+        <a:font script="Hang" typeface="맑은 고딕"/>
+        <a:font script="Hans" typeface="宋体"/>
+        <a:font script="Hant" typeface="新細明體"/>
+        <a:font script="Arab" typeface="Times New Roman"/>
+        <a:font script="Hebr" typeface="Times New Roman"/>
+        <a:font script="Thai" typeface="Angsana New"/>
+        <a:font script="Ethi" typeface="Nyala"/>
+        <a:font script="Beng" typeface="Vrinda"/>
+        <a:font script="Gujr" typeface="Shruti"/>
+        <a:font script="Khmr" typeface="MoolBoran"/>
+        <a:font script="Knda" typeface="Tunga"/>
+        <a:font script="Guru" typeface="Raavi"/>
+        <a:font script="Cans" typeface="Euphemia"/>
+        <a:font script="Cher" typeface="Plantagenet Cherokee"/>
+        <a:font script="Yiii" typeface="Microsoft Yi Baiti"/>
+        <a:font script="Tibt" typeface="Microsoft Himalaya"/>
+        <a:font script="Thaa" typeface="MV Boli"/>
+        <a:font script="Deva" typeface="Mangal"/>
+        <a:font script="Telu" typeface="Gautami"/>
+        <a:font script="Taml" typeface="Latha"/>
+        <a:font script="Syrc" typeface="Estrangelo Edessa"/>
+        <a:font script="Orya" typeface="Kalinga"/>
+        <a:font script="Mlym" typeface="Kartika"/>
+        <a:font script="Laoo" typeface="DokChampa"/>
+        <a:font script="Sinh" typeface="Iskoola Pota"/>
+        <a:font script="Mong" typeface="Mongolian Baiti"/>
+        <a:font script="Viet" typeface="Times New Roman"/>
+        <a:font script="Uigh" typeface="Microsoft Uighur"/>
+        <a:font script="Geor" typeface="Sylfaen"/>
+      </a:majorFont>
+      <a:minorFont>
+        <a:latin typeface="Calibri"/>
+        <a:ea typeface=""/>
+        <a:cs typeface=""/>
+        <a:font script="Jpan" typeface="ＭＳ Ｐゴシック"/>
+        <a:font script="Hang" typeface="맑은 고딕"/>
+        <a:font script="Hans" typeface="宋体"/>
+        <a:font script="Hant" typeface="新細明體"/>
+        <a:font script="Arab" typeface="Arial"/>
+        <a:font script="Hebr" typeface="Arial"/>
+        <a:font script="Thai" typeface="Cordia New"/>
+        <a:font script="Ethi" typeface="Nyala"/>
+        <a:font script="Beng" typeface="Vrinda"/>
+        <a:font script="Gujr" typeface="Shruti"/>
+        <a:font script="Khmr" typeface="DaunPenh"/>
+        <a:font script="Knda" typeface="Tunga"/>
+        <a:font script="Guru" typeface="Raavi"/>
+        <a:font script="Cans" typeface="Euphemia"/>
+        <a:font script="Cher" typeface="Plantagenet Cherokee"/>
+        <a:font script="Yiii" typeface="Microsoft Yi Baiti"/>
+        <a:font script="Tibt" typeface="Microsoft Himalaya"/>
+        <a:font script="Thaa" typeface="MV Boli"/>
+        <a:font script="Deva" typeface="Mangal"/>
+        <a:font script="Telu" typeface="Gautami"/>
+        <a:font script="Taml" typeface="Latha"/>
+        <a:font script="Syrc" typeface="Estrangelo Edessa"/>
+        <a:font script="Orya" typeface="Kalinga"/>
+        <a:font script="Mlym" typeface="Kartika"/>
+        <a:font script="Laoo" typeface="DokChampa"/>
+        <a:font script="Sinh" typeface="Iskoola Pota"/>
+        <a:font script="Mong" typeface="Mongolian Baiti"/>
+        <a:font script="Viet" typeface="Arial"/>
+        <a:font script="Uigh" typeface="Microsoft Uighur"/>
+        <a:font script="Geor" typeface="Sylfaen"/>
+      </a:minorFont>
+    </a:fontScheme>
+    <a:fmtScheme name="Office">
+      <a:fillStyleLst>
+        <a:solidFill>
+          <a:schemeClr val="phClr"/>
+        </a:solidFill>
+        <a:gradFill rotWithShape="1">
+          <a:gsLst>
+            <a:gs pos="0">
+              <a:schemeClr val="phClr">
+                <a:lumMod val="110000"/>
+                <a:satMod val="105000"/>
+                <a:tint val="67000"/>
+              </a:schemeClr>
+            </a:gs>
+            <a:gs pos="50000">
+              <a:schemeClr val="phClr">
+                <a:lumMod val="105000"/>
+                <a:satMod val="103000"/>
+                <a:tint val="73000"/>
+              </a:schemeClr>
+            </a:gs>
+            <a:gs pos="100000">
+              <a:schemeClr val="phClr">
+                <a:lumMod val="105000"/>
+                <a:satMod val="109000"/>
+                <a:tint val="81000"/>
+              </a:schemeClr>
+            </a:gs>
+          </a:gsLst>
+          <a:lin ang="5400000" scaled="0"/>
+        </a:gradFill>
+        <a:gradFill rotWithShape="1">
+          <a:gsLst>
+            <a:gs pos="0">
+              <a:schemeClr val="phClr">
+                <a:satMod val="103000"/>
+                <a:lumMod val="102000"/>
+                <a:tint val="94000"/>
+              </a:schemeClr>
+            </a:gs>
+            <a:gs pos="50000">
+              <a:schemeClr val="phClr">
+                <a:satMod val="110000"/>
+                <a:lumMod val="100000"/>
+                <a:shade val="100000"/>
+              </a:schemeClr>
+            </a:gs>
+            <a:gs pos="100000">
+              <a:schemeClr val="phClr">
+                <a:lumMod val="99000"/>
+                <a:satMod val="120000"/>
+                <a:shade val="78000"/>
+              </a:schemeClr>
+            </a:gs>
+          </a:gsLst>
+          <a:lin ang="5400000" scaled="0"/>
+        </a:gradFill>
+      </a:fillStyleLst>
+      <a:lnStyleLst>
+        <a:ln w="6350" cap="flat" cmpd="sng" algn="ctr">
+          <a:solidFill>
+            <a:schemeClr val="phClr"/>
+          </a:solidFill>
+          <a:prstDash val="solid"/>
+          <a:miter lim="800000"/>
+        </a:ln>
+        <a:ln w="12700" cap="flat" cmpd="sng" algn="ctr">
+          <a:solidFill>
+            <a:schemeClr val="phClr"/>
+          </a:solidFill>
+          <a:prstDash val="solid"/>
+          <a:miter lim="800000"/>
+        </a:ln>
+        <a:ln w="19050" cap="flat" cmpd="sng" algn="ctr">
+          <a:solidFill>
+            <a:schemeClr val="phClr"/>
+          </a:solidFill>
+          <a:prstDash val="solid"/>
+          <a:miter lim="800000"/>
+        </a:ln>
+      </a:lnStyleLst>
+      <a:effectStyleLst>
+        <a:effectStyle>
+          <a:effectLst/>
+        </a:effectStyle>
+        <a:effectStyle>
+          <a:effectLst/>
+        </a:effectStyle>
+        <a:effectStyle>
+          <a:effectLst>
+            <a:outerShdw blurRad="57150" dist="19050" dir="5400000" algn="ctr" rotWithShape="0">
+              <a:srgbClr val="000000">
+                <a:alpha val="63000"/>
+              </a:srgbClr>
+            </a:outerShdw>
+          </a:effectLst>
+        </a:effectStyle>
+      </a:effectStyleLst>
+      <a:bgFillStyleLst>
+        <a:solidFill>
+          <a:schemeClr val="phClr"/>
+        </a:solidFill>
+        <a:solidFill>
+          <a:schemeClr val="phClr">
+            <a:tint val="95000"/>
+            <a:satMod val="170000"/>
+          </a:schemeClr>
+        </a:solidFill>
+        <a:gradFill rotWithShape="1">
+          <a:gsLst>
+            <a:gs pos="0">
+              <a:schemeClr val="phClr">
+                <a:tint val="93000"/>
+                <a:satMod val="150000"/>
+                <a:shade val="98000"/>
+                <a:lumMod val="102000"/>
+              </a:schemeClr>
+            </a:gs>
+            <a:gs pos="50000">
+              <a:schemeClr val="phClr">
+                <a:tint val="98000"/>
+                <a:satMod val="130000"/>
+                <a:shade val="90000"/>
+                <a:lumMod val="103000"/>
+              </a:schemeClr>
+            </a:gs>
+            <a:gs pos="100000">
+              <a:schemeClr val="phClr">
+                <a:shade val="63000"/>
+                <a:satMod val="120000"/>
+              </a:schemeClr>
+            </a:gs>
+          </a:gsLst>
+          <a:lin ang="5400000" scaled="0"/>
+        </a:gradFill>
+      </a:bgFillStyleLst>
+    </a:fmtScheme>
+  </a:themeElements>
+  <a:objectDefaults/>
+  <a:extraClrSchemeLst/>
+  <a:extLst>
+    <a:ext uri="{05A4C25C-085E-4340-85A3-A5531E510DB2}">
+      <thm15:themeFamily xmlns:thm15="http://schemas.microsoft.com/office/thememl/2012/main" name="Office Theme" id="{62F939B6-93AF-4DB8-9C6B-D6C7DFDC589F}" vid="{4A3C46E8-61CC-4603-A589-7422A47A8E4A}"/>
     </a:ext>
   </a:extLst>
 </a:theme>

</xml_diff>